<commit_message>
Remove doc (I never conquer office)
</commit_message>
<xml_diff>
--- a/gitwstul.pptx
+++ b/gitwstul.pptx
@@ -5,7 +5,7 @@
     <p:sldMasterId id="2147483648" r:id="rId1"/>
   </p:sldMasterIdLst>
   <p:notesMasterIdLst>
-    <p:notesMasterId r:id="rId28"/>
+    <p:notesMasterId r:id="rId29"/>
   </p:notesMasterIdLst>
   <p:sldIdLst>
     <p:sldId id="256" r:id="rId2"/>
@@ -32,8 +32,9 @@
     <p:sldId id="279" r:id="rId23"/>
     <p:sldId id="281" r:id="rId24"/>
     <p:sldId id="280" r:id="rId25"/>
-    <p:sldId id="283" r:id="rId26"/>
-    <p:sldId id="282" r:id="rId27"/>
+    <p:sldId id="284" r:id="rId26"/>
+    <p:sldId id="283" r:id="rId27"/>
+    <p:sldId id="282" r:id="rId28"/>
   </p:sldIdLst>
   <p:sldSz cx="12192000" cy="6858000"/>
   <p:notesSz cx="6858000" cy="9144000"/>
@@ -135,6 +136,9 @@
   <p:extLst>
     <p:ext uri="{EFAFB233-063F-42B5-8137-9DF3F51BA10A}">
       <p15:sldGuideLst xmlns:p15="http://schemas.microsoft.com/office/powerpoint/2012/main"/>
+    </p:ext>
+    <p:ext uri="{2D200454-40CA-4A62-9FC3-DE9A4176ACB9}">
+      <p15:notesGuideLst xmlns:p15="http://schemas.microsoft.com/office/powerpoint/2012/main"/>
     </p:ext>
   </p:extLst>
 </p:presentation>
@@ -533,34 +537,7 @@
           <a:bodyPr/>
           <a:lstStyle/>
           <a:p>
-            <a:r>
-              <a:rPr lang="cs-CZ" dirty="0">
-                <a:hlinkClick r:id="rId3"/>
-              </a:rPr>
-              <a:t>https://docs.github.com/en/get-started/quickstart/set-up-git</a:t>
-            </a:r>
-            <a:endParaRPr lang="cs-CZ" dirty="0"/>
-          </a:p>
-          <a:p>
-            <a:r>
-              <a:rPr lang="cs-CZ" dirty="0">
-                <a:hlinkClick r:id="rId4"/>
-              </a:rPr>
-              <a:t>https://docs.github.com/en/get-started/getting-started-with-git/about-remote-repositories#cloning-with-https-urls</a:t>
-            </a:r>
-            <a:endParaRPr lang="cs-CZ" dirty="0"/>
-          </a:p>
-          <a:p>
-            <a:r>
-              <a:rPr lang="cs-CZ" dirty="0">
-                <a:hlinkClick r:id="rId5"/>
-              </a:rPr>
-              <a:t>https://docs.github.com/en/authentication/keeping-your-account-and-data-secure/creating-a-personal-access-token</a:t>
-            </a:r>
-            <a:endParaRPr lang="cs-CZ" dirty="0"/>
-          </a:p>
-          <a:p>
-            <a:endParaRPr lang="cs-CZ" dirty="0"/>
+            <a:endParaRPr lang="cs-CZ"/>
           </a:p>
         </p:txBody>
       </p:sp>
@@ -581,7 +558,7 @@
           <a:p>
             <a:fld id="{D93DBBC2-0A93-45A2-B591-A3FFF136712D}" type="slidenum">
               <a:rPr lang="cs-CZ" smtClean="0"/>
-              <a:t>24</a:t>
+              <a:t>1</a:t>
             </a:fld>
             <a:endParaRPr lang="cs-CZ"/>
           </a:p>
@@ -590,7 +567,847 @@
     </p:spTree>
     <p:extLst>
       <p:ext uri="{BB962C8B-B14F-4D97-AF65-F5344CB8AC3E}">
-        <p14:creationId xmlns:p14="http://schemas.microsoft.com/office/powerpoint/2010/main" val="536103699"/>
+        <p14:creationId xmlns:p14="http://schemas.microsoft.com/office/powerpoint/2010/main" val="2324784459"/>
+      </p:ext>
+    </p:extLst>
+  </p:cSld>
+  <p:clrMapOvr>
+    <a:masterClrMapping/>
+  </p:clrMapOvr>
+</p:notes>
+</file>
+
+<file path=ppt/notesSlides/notesSlide10.xml><?xml version="1.0" encoding="utf-8"?>
+<p:notes xmlns:a="http://schemas.openxmlformats.org/drawingml/2006/main" xmlns:r="http://schemas.openxmlformats.org/officeDocument/2006/relationships" xmlns:p="http://schemas.openxmlformats.org/presentationml/2006/main">
+  <p:cSld>
+    <p:spTree>
+      <p:nvGrpSpPr>
+        <p:cNvPr id="1" name=""/>
+        <p:cNvGrpSpPr/>
+        <p:nvPr/>
+      </p:nvGrpSpPr>
+      <p:grpSpPr>
+        <a:xfrm>
+          <a:off x="0" y="0"/>
+          <a:ext cx="0" cy="0"/>
+          <a:chOff x="0" y="0"/>
+          <a:chExt cx="0" cy="0"/>
+        </a:xfrm>
+      </p:grpSpPr>
+      <p:sp>
+        <p:nvSpPr>
+          <p:cNvPr id="2" name="Zástupný symbol pro obrázek snímku 1"/>
+          <p:cNvSpPr>
+            <a:spLocks noGrp="1" noRot="1" noChangeAspect="1"/>
+          </p:cNvSpPr>
+          <p:nvPr>
+            <p:ph type="sldImg"/>
+          </p:nvPr>
+        </p:nvSpPr>
+        <p:spPr/>
+      </p:sp>
+      <p:sp>
+        <p:nvSpPr>
+          <p:cNvPr id="3" name="Zástupný symbol pro poznámky 2"/>
+          <p:cNvSpPr>
+            <a:spLocks noGrp="1"/>
+          </p:cNvSpPr>
+          <p:nvPr>
+            <p:ph type="body" idx="1"/>
+          </p:nvPr>
+        </p:nvSpPr>
+        <p:spPr/>
+        <p:txBody>
+          <a:bodyPr/>
+          <a:lstStyle/>
+          <a:p>
+            <a:endParaRPr lang="cs-CZ"/>
+          </a:p>
+        </p:txBody>
+      </p:sp>
+      <p:sp>
+        <p:nvSpPr>
+          <p:cNvPr id="4" name="Zástupný symbol pro číslo snímku 3"/>
+          <p:cNvSpPr>
+            <a:spLocks noGrp="1"/>
+          </p:cNvSpPr>
+          <p:nvPr>
+            <p:ph type="sldNum" sz="quarter" idx="5"/>
+          </p:nvPr>
+        </p:nvSpPr>
+        <p:spPr/>
+        <p:txBody>
+          <a:bodyPr/>
+          <a:lstStyle/>
+          <a:p>
+            <a:fld id="{D93DBBC2-0A93-45A2-B591-A3FFF136712D}" type="slidenum">
+              <a:rPr lang="cs-CZ" smtClean="0"/>
+              <a:t>10</a:t>
+            </a:fld>
+            <a:endParaRPr lang="cs-CZ"/>
+          </a:p>
+        </p:txBody>
+      </p:sp>
+    </p:spTree>
+    <p:extLst>
+      <p:ext uri="{BB962C8B-B14F-4D97-AF65-F5344CB8AC3E}">
+        <p14:creationId xmlns:p14="http://schemas.microsoft.com/office/powerpoint/2010/main" val="2537589227"/>
+      </p:ext>
+    </p:extLst>
+  </p:cSld>
+  <p:clrMapOvr>
+    <a:masterClrMapping/>
+  </p:clrMapOvr>
+</p:notes>
+</file>
+
+<file path=ppt/notesSlides/notesSlide11.xml><?xml version="1.0" encoding="utf-8"?>
+<p:notes xmlns:a="http://schemas.openxmlformats.org/drawingml/2006/main" xmlns:r="http://schemas.openxmlformats.org/officeDocument/2006/relationships" xmlns:p="http://schemas.openxmlformats.org/presentationml/2006/main">
+  <p:cSld>
+    <p:spTree>
+      <p:nvGrpSpPr>
+        <p:cNvPr id="1" name=""/>
+        <p:cNvGrpSpPr/>
+        <p:nvPr/>
+      </p:nvGrpSpPr>
+      <p:grpSpPr>
+        <a:xfrm>
+          <a:off x="0" y="0"/>
+          <a:ext cx="0" cy="0"/>
+          <a:chOff x="0" y="0"/>
+          <a:chExt cx="0" cy="0"/>
+        </a:xfrm>
+      </p:grpSpPr>
+      <p:sp>
+        <p:nvSpPr>
+          <p:cNvPr id="2" name="Zástupný symbol pro obrázek snímku 1"/>
+          <p:cNvSpPr>
+            <a:spLocks noGrp="1" noRot="1" noChangeAspect="1"/>
+          </p:cNvSpPr>
+          <p:nvPr>
+            <p:ph type="sldImg"/>
+          </p:nvPr>
+        </p:nvSpPr>
+        <p:spPr/>
+      </p:sp>
+      <p:sp>
+        <p:nvSpPr>
+          <p:cNvPr id="3" name="Zástupný symbol pro poznámky 2"/>
+          <p:cNvSpPr>
+            <a:spLocks noGrp="1"/>
+          </p:cNvSpPr>
+          <p:nvPr>
+            <p:ph type="body" idx="1"/>
+          </p:nvPr>
+        </p:nvSpPr>
+        <p:spPr/>
+        <p:txBody>
+          <a:bodyPr/>
+          <a:lstStyle/>
+          <a:p>
+            <a:endParaRPr lang="cs-CZ"/>
+          </a:p>
+        </p:txBody>
+      </p:sp>
+      <p:sp>
+        <p:nvSpPr>
+          <p:cNvPr id="4" name="Zástupný symbol pro číslo snímku 3"/>
+          <p:cNvSpPr>
+            <a:spLocks noGrp="1"/>
+          </p:cNvSpPr>
+          <p:nvPr>
+            <p:ph type="sldNum" sz="quarter" idx="5"/>
+          </p:nvPr>
+        </p:nvSpPr>
+        <p:spPr/>
+        <p:txBody>
+          <a:bodyPr/>
+          <a:lstStyle/>
+          <a:p>
+            <a:fld id="{D93DBBC2-0A93-45A2-B591-A3FFF136712D}" type="slidenum">
+              <a:rPr lang="cs-CZ" smtClean="0"/>
+              <a:t>11</a:t>
+            </a:fld>
+            <a:endParaRPr lang="cs-CZ"/>
+          </a:p>
+        </p:txBody>
+      </p:sp>
+    </p:spTree>
+    <p:extLst>
+      <p:ext uri="{BB962C8B-B14F-4D97-AF65-F5344CB8AC3E}">
+        <p14:creationId xmlns:p14="http://schemas.microsoft.com/office/powerpoint/2010/main" val="2830300950"/>
+      </p:ext>
+    </p:extLst>
+  </p:cSld>
+  <p:clrMapOvr>
+    <a:masterClrMapping/>
+  </p:clrMapOvr>
+</p:notes>
+</file>
+
+<file path=ppt/notesSlides/notesSlide12.xml><?xml version="1.0" encoding="utf-8"?>
+<p:notes xmlns:a="http://schemas.openxmlformats.org/drawingml/2006/main" xmlns:r="http://schemas.openxmlformats.org/officeDocument/2006/relationships" xmlns:p="http://schemas.openxmlformats.org/presentationml/2006/main">
+  <p:cSld>
+    <p:spTree>
+      <p:nvGrpSpPr>
+        <p:cNvPr id="1" name=""/>
+        <p:cNvGrpSpPr/>
+        <p:nvPr/>
+      </p:nvGrpSpPr>
+      <p:grpSpPr>
+        <a:xfrm>
+          <a:off x="0" y="0"/>
+          <a:ext cx="0" cy="0"/>
+          <a:chOff x="0" y="0"/>
+          <a:chExt cx="0" cy="0"/>
+        </a:xfrm>
+      </p:grpSpPr>
+      <p:sp>
+        <p:nvSpPr>
+          <p:cNvPr id="2" name="Zástupný symbol pro obrázek snímku 1"/>
+          <p:cNvSpPr>
+            <a:spLocks noGrp="1" noRot="1" noChangeAspect="1"/>
+          </p:cNvSpPr>
+          <p:nvPr>
+            <p:ph type="sldImg"/>
+          </p:nvPr>
+        </p:nvSpPr>
+        <p:spPr/>
+      </p:sp>
+      <p:sp>
+        <p:nvSpPr>
+          <p:cNvPr id="3" name="Zástupný symbol pro poznámky 2"/>
+          <p:cNvSpPr>
+            <a:spLocks noGrp="1"/>
+          </p:cNvSpPr>
+          <p:nvPr>
+            <p:ph type="body" idx="1"/>
+          </p:nvPr>
+        </p:nvSpPr>
+        <p:spPr/>
+        <p:txBody>
+          <a:bodyPr/>
+          <a:lstStyle/>
+          <a:p>
+            <a:endParaRPr lang="cs-CZ"/>
+          </a:p>
+        </p:txBody>
+      </p:sp>
+      <p:sp>
+        <p:nvSpPr>
+          <p:cNvPr id="4" name="Zástupný symbol pro číslo snímku 3"/>
+          <p:cNvSpPr>
+            <a:spLocks noGrp="1"/>
+          </p:cNvSpPr>
+          <p:nvPr>
+            <p:ph type="sldNum" sz="quarter" idx="5"/>
+          </p:nvPr>
+        </p:nvSpPr>
+        <p:spPr/>
+        <p:txBody>
+          <a:bodyPr/>
+          <a:lstStyle/>
+          <a:p>
+            <a:fld id="{D93DBBC2-0A93-45A2-B591-A3FFF136712D}" type="slidenum">
+              <a:rPr lang="cs-CZ" smtClean="0"/>
+              <a:t>12</a:t>
+            </a:fld>
+            <a:endParaRPr lang="cs-CZ"/>
+          </a:p>
+        </p:txBody>
+      </p:sp>
+    </p:spTree>
+    <p:extLst>
+      <p:ext uri="{BB962C8B-B14F-4D97-AF65-F5344CB8AC3E}">
+        <p14:creationId xmlns:p14="http://schemas.microsoft.com/office/powerpoint/2010/main" val="1947762419"/>
+      </p:ext>
+    </p:extLst>
+  </p:cSld>
+  <p:clrMapOvr>
+    <a:masterClrMapping/>
+  </p:clrMapOvr>
+</p:notes>
+</file>
+
+<file path=ppt/notesSlides/notesSlide13.xml><?xml version="1.0" encoding="utf-8"?>
+<p:notes xmlns:a="http://schemas.openxmlformats.org/drawingml/2006/main" xmlns:r="http://schemas.openxmlformats.org/officeDocument/2006/relationships" xmlns:p="http://schemas.openxmlformats.org/presentationml/2006/main">
+  <p:cSld>
+    <p:spTree>
+      <p:nvGrpSpPr>
+        <p:cNvPr id="1" name=""/>
+        <p:cNvGrpSpPr/>
+        <p:nvPr/>
+      </p:nvGrpSpPr>
+      <p:grpSpPr>
+        <a:xfrm>
+          <a:off x="0" y="0"/>
+          <a:ext cx="0" cy="0"/>
+          <a:chOff x="0" y="0"/>
+          <a:chExt cx="0" cy="0"/>
+        </a:xfrm>
+      </p:grpSpPr>
+      <p:sp>
+        <p:nvSpPr>
+          <p:cNvPr id="2" name="Zástupný symbol pro obrázek snímku 1"/>
+          <p:cNvSpPr>
+            <a:spLocks noGrp="1" noRot="1" noChangeAspect="1"/>
+          </p:cNvSpPr>
+          <p:nvPr>
+            <p:ph type="sldImg"/>
+          </p:nvPr>
+        </p:nvSpPr>
+        <p:spPr/>
+      </p:sp>
+      <p:sp>
+        <p:nvSpPr>
+          <p:cNvPr id="3" name="Zástupný symbol pro poznámky 2"/>
+          <p:cNvSpPr>
+            <a:spLocks noGrp="1"/>
+          </p:cNvSpPr>
+          <p:nvPr>
+            <p:ph type="body" idx="1"/>
+          </p:nvPr>
+        </p:nvSpPr>
+        <p:spPr/>
+        <p:txBody>
+          <a:bodyPr/>
+          <a:lstStyle/>
+          <a:p>
+            <a:endParaRPr lang="cs-CZ"/>
+          </a:p>
+        </p:txBody>
+      </p:sp>
+      <p:sp>
+        <p:nvSpPr>
+          <p:cNvPr id="4" name="Zástupný symbol pro číslo snímku 3"/>
+          <p:cNvSpPr>
+            <a:spLocks noGrp="1"/>
+          </p:cNvSpPr>
+          <p:nvPr>
+            <p:ph type="sldNum" sz="quarter" idx="5"/>
+          </p:nvPr>
+        </p:nvSpPr>
+        <p:spPr/>
+        <p:txBody>
+          <a:bodyPr/>
+          <a:lstStyle/>
+          <a:p>
+            <a:fld id="{D93DBBC2-0A93-45A2-B591-A3FFF136712D}" type="slidenum">
+              <a:rPr lang="cs-CZ" smtClean="0"/>
+              <a:t>13</a:t>
+            </a:fld>
+            <a:endParaRPr lang="cs-CZ"/>
+          </a:p>
+        </p:txBody>
+      </p:sp>
+    </p:spTree>
+    <p:extLst>
+      <p:ext uri="{BB962C8B-B14F-4D97-AF65-F5344CB8AC3E}">
+        <p14:creationId xmlns:p14="http://schemas.microsoft.com/office/powerpoint/2010/main" val="1253586685"/>
+      </p:ext>
+    </p:extLst>
+  </p:cSld>
+  <p:clrMapOvr>
+    <a:masterClrMapping/>
+  </p:clrMapOvr>
+</p:notes>
+</file>
+
+<file path=ppt/notesSlides/notesSlide14.xml><?xml version="1.0" encoding="utf-8"?>
+<p:notes xmlns:a="http://schemas.openxmlformats.org/drawingml/2006/main" xmlns:r="http://schemas.openxmlformats.org/officeDocument/2006/relationships" xmlns:p="http://schemas.openxmlformats.org/presentationml/2006/main">
+  <p:cSld>
+    <p:spTree>
+      <p:nvGrpSpPr>
+        <p:cNvPr id="1" name=""/>
+        <p:cNvGrpSpPr/>
+        <p:nvPr/>
+      </p:nvGrpSpPr>
+      <p:grpSpPr>
+        <a:xfrm>
+          <a:off x="0" y="0"/>
+          <a:ext cx="0" cy="0"/>
+          <a:chOff x="0" y="0"/>
+          <a:chExt cx="0" cy="0"/>
+        </a:xfrm>
+      </p:grpSpPr>
+      <p:sp>
+        <p:nvSpPr>
+          <p:cNvPr id="2" name="Zástupný symbol pro obrázek snímku 1"/>
+          <p:cNvSpPr>
+            <a:spLocks noGrp="1" noRot="1" noChangeAspect="1"/>
+          </p:cNvSpPr>
+          <p:nvPr>
+            <p:ph type="sldImg"/>
+          </p:nvPr>
+        </p:nvSpPr>
+        <p:spPr/>
+      </p:sp>
+      <p:sp>
+        <p:nvSpPr>
+          <p:cNvPr id="3" name="Zástupný symbol pro poznámky 2"/>
+          <p:cNvSpPr>
+            <a:spLocks noGrp="1"/>
+          </p:cNvSpPr>
+          <p:nvPr>
+            <p:ph type="body" idx="1"/>
+          </p:nvPr>
+        </p:nvSpPr>
+        <p:spPr/>
+        <p:txBody>
+          <a:bodyPr/>
+          <a:lstStyle/>
+          <a:p>
+            <a:endParaRPr lang="cs-CZ"/>
+          </a:p>
+        </p:txBody>
+      </p:sp>
+      <p:sp>
+        <p:nvSpPr>
+          <p:cNvPr id="4" name="Zástupný symbol pro číslo snímku 3"/>
+          <p:cNvSpPr>
+            <a:spLocks noGrp="1"/>
+          </p:cNvSpPr>
+          <p:nvPr>
+            <p:ph type="sldNum" sz="quarter" idx="5"/>
+          </p:nvPr>
+        </p:nvSpPr>
+        <p:spPr/>
+        <p:txBody>
+          <a:bodyPr/>
+          <a:lstStyle/>
+          <a:p>
+            <a:fld id="{D93DBBC2-0A93-45A2-B591-A3FFF136712D}" type="slidenum">
+              <a:rPr lang="cs-CZ" smtClean="0"/>
+              <a:t>14</a:t>
+            </a:fld>
+            <a:endParaRPr lang="cs-CZ"/>
+          </a:p>
+        </p:txBody>
+      </p:sp>
+    </p:spTree>
+    <p:extLst>
+      <p:ext uri="{BB962C8B-B14F-4D97-AF65-F5344CB8AC3E}">
+        <p14:creationId xmlns:p14="http://schemas.microsoft.com/office/powerpoint/2010/main" val="3584434167"/>
+      </p:ext>
+    </p:extLst>
+  </p:cSld>
+  <p:clrMapOvr>
+    <a:masterClrMapping/>
+  </p:clrMapOvr>
+</p:notes>
+</file>
+
+<file path=ppt/notesSlides/notesSlide15.xml><?xml version="1.0" encoding="utf-8"?>
+<p:notes xmlns:a="http://schemas.openxmlformats.org/drawingml/2006/main" xmlns:r="http://schemas.openxmlformats.org/officeDocument/2006/relationships" xmlns:p="http://schemas.openxmlformats.org/presentationml/2006/main">
+  <p:cSld>
+    <p:spTree>
+      <p:nvGrpSpPr>
+        <p:cNvPr id="1" name=""/>
+        <p:cNvGrpSpPr/>
+        <p:nvPr/>
+      </p:nvGrpSpPr>
+      <p:grpSpPr>
+        <a:xfrm>
+          <a:off x="0" y="0"/>
+          <a:ext cx="0" cy="0"/>
+          <a:chOff x="0" y="0"/>
+          <a:chExt cx="0" cy="0"/>
+        </a:xfrm>
+      </p:grpSpPr>
+      <p:sp>
+        <p:nvSpPr>
+          <p:cNvPr id="2" name="Zástupný symbol pro obrázek snímku 1"/>
+          <p:cNvSpPr>
+            <a:spLocks noGrp="1" noRot="1" noChangeAspect="1"/>
+          </p:cNvSpPr>
+          <p:nvPr>
+            <p:ph type="sldImg"/>
+          </p:nvPr>
+        </p:nvSpPr>
+        <p:spPr/>
+      </p:sp>
+      <p:sp>
+        <p:nvSpPr>
+          <p:cNvPr id="3" name="Zástupný symbol pro poznámky 2"/>
+          <p:cNvSpPr>
+            <a:spLocks noGrp="1"/>
+          </p:cNvSpPr>
+          <p:nvPr>
+            <p:ph type="body" idx="1"/>
+          </p:nvPr>
+        </p:nvSpPr>
+        <p:spPr/>
+        <p:txBody>
+          <a:bodyPr/>
+          <a:lstStyle/>
+          <a:p>
+            <a:endParaRPr lang="cs-CZ"/>
+          </a:p>
+        </p:txBody>
+      </p:sp>
+      <p:sp>
+        <p:nvSpPr>
+          <p:cNvPr id="4" name="Zástupný symbol pro číslo snímku 3"/>
+          <p:cNvSpPr>
+            <a:spLocks noGrp="1"/>
+          </p:cNvSpPr>
+          <p:nvPr>
+            <p:ph type="sldNum" sz="quarter" idx="5"/>
+          </p:nvPr>
+        </p:nvSpPr>
+        <p:spPr/>
+        <p:txBody>
+          <a:bodyPr/>
+          <a:lstStyle/>
+          <a:p>
+            <a:fld id="{D93DBBC2-0A93-45A2-B591-A3FFF136712D}" type="slidenum">
+              <a:rPr lang="cs-CZ" smtClean="0"/>
+              <a:t>15</a:t>
+            </a:fld>
+            <a:endParaRPr lang="cs-CZ"/>
+          </a:p>
+        </p:txBody>
+      </p:sp>
+    </p:spTree>
+    <p:extLst>
+      <p:ext uri="{BB962C8B-B14F-4D97-AF65-F5344CB8AC3E}">
+        <p14:creationId xmlns:p14="http://schemas.microsoft.com/office/powerpoint/2010/main" val="4014693778"/>
+      </p:ext>
+    </p:extLst>
+  </p:cSld>
+  <p:clrMapOvr>
+    <a:masterClrMapping/>
+  </p:clrMapOvr>
+</p:notes>
+</file>
+
+<file path=ppt/notesSlides/notesSlide16.xml><?xml version="1.0" encoding="utf-8"?>
+<p:notes xmlns:a="http://schemas.openxmlformats.org/drawingml/2006/main" xmlns:r="http://schemas.openxmlformats.org/officeDocument/2006/relationships" xmlns:p="http://schemas.openxmlformats.org/presentationml/2006/main">
+  <p:cSld>
+    <p:spTree>
+      <p:nvGrpSpPr>
+        <p:cNvPr id="1" name=""/>
+        <p:cNvGrpSpPr/>
+        <p:nvPr/>
+      </p:nvGrpSpPr>
+      <p:grpSpPr>
+        <a:xfrm>
+          <a:off x="0" y="0"/>
+          <a:ext cx="0" cy="0"/>
+          <a:chOff x="0" y="0"/>
+          <a:chExt cx="0" cy="0"/>
+        </a:xfrm>
+      </p:grpSpPr>
+      <p:sp>
+        <p:nvSpPr>
+          <p:cNvPr id="2" name="Zástupný symbol pro obrázek snímku 1"/>
+          <p:cNvSpPr>
+            <a:spLocks noGrp="1" noRot="1" noChangeAspect="1"/>
+          </p:cNvSpPr>
+          <p:nvPr>
+            <p:ph type="sldImg"/>
+          </p:nvPr>
+        </p:nvSpPr>
+        <p:spPr/>
+      </p:sp>
+      <p:sp>
+        <p:nvSpPr>
+          <p:cNvPr id="3" name="Zástupný symbol pro poznámky 2"/>
+          <p:cNvSpPr>
+            <a:spLocks noGrp="1"/>
+          </p:cNvSpPr>
+          <p:nvPr>
+            <p:ph type="body" idx="1"/>
+          </p:nvPr>
+        </p:nvSpPr>
+        <p:spPr/>
+        <p:txBody>
+          <a:bodyPr/>
+          <a:lstStyle/>
+          <a:p>
+            <a:endParaRPr lang="cs-CZ"/>
+          </a:p>
+        </p:txBody>
+      </p:sp>
+      <p:sp>
+        <p:nvSpPr>
+          <p:cNvPr id="4" name="Zástupný symbol pro číslo snímku 3"/>
+          <p:cNvSpPr>
+            <a:spLocks noGrp="1"/>
+          </p:cNvSpPr>
+          <p:nvPr>
+            <p:ph type="sldNum" sz="quarter" idx="5"/>
+          </p:nvPr>
+        </p:nvSpPr>
+        <p:spPr/>
+        <p:txBody>
+          <a:bodyPr/>
+          <a:lstStyle/>
+          <a:p>
+            <a:fld id="{D93DBBC2-0A93-45A2-B591-A3FFF136712D}" type="slidenum">
+              <a:rPr lang="cs-CZ" smtClean="0"/>
+              <a:t>16</a:t>
+            </a:fld>
+            <a:endParaRPr lang="cs-CZ"/>
+          </a:p>
+        </p:txBody>
+      </p:sp>
+    </p:spTree>
+    <p:extLst>
+      <p:ext uri="{BB962C8B-B14F-4D97-AF65-F5344CB8AC3E}">
+        <p14:creationId xmlns:p14="http://schemas.microsoft.com/office/powerpoint/2010/main" val="2183052804"/>
+      </p:ext>
+    </p:extLst>
+  </p:cSld>
+  <p:clrMapOvr>
+    <a:masterClrMapping/>
+  </p:clrMapOvr>
+</p:notes>
+</file>
+
+<file path=ppt/notesSlides/notesSlide17.xml><?xml version="1.0" encoding="utf-8"?>
+<p:notes xmlns:a="http://schemas.openxmlformats.org/drawingml/2006/main" xmlns:r="http://schemas.openxmlformats.org/officeDocument/2006/relationships" xmlns:p="http://schemas.openxmlformats.org/presentationml/2006/main">
+  <p:cSld>
+    <p:spTree>
+      <p:nvGrpSpPr>
+        <p:cNvPr id="1" name=""/>
+        <p:cNvGrpSpPr/>
+        <p:nvPr/>
+      </p:nvGrpSpPr>
+      <p:grpSpPr>
+        <a:xfrm>
+          <a:off x="0" y="0"/>
+          <a:ext cx="0" cy="0"/>
+          <a:chOff x="0" y="0"/>
+          <a:chExt cx="0" cy="0"/>
+        </a:xfrm>
+      </p:grpSpPr>
+      <p:sp>
+        <p:nvSpPr>
+          <p:cNvPr id="2" name="Zástupný symbol pro obrázek snímku 1"/>
+          <p:cNvSpPr>
+            <a:spLocks noGrp="1" noRot="1" noChangeAspect="1"/>
+          </p:cNvSpPr>
+          <p:nvPr>
+            <p:ph type="sldImg"/>
+          </p:nvPr>
+        </p:nvSpPr>
+        <p:spPr/>
+      </p:sp>
+      <p:sp>
+        <p:nvSpPr>
+          <p:cNvPr id="3" name="Zástupný symbol pro poznámky 2"/>
+          <p:cNvSpPr>
+            <a:spLocks noGrp="1"/>
+          </p:cNvSpPr>
+          <p:nvPr>
+            <p:ph type="body" idx="1"/>
+          </p:nvPr>
+        </p:nvSpPr>
+        <p:spPr/>
+        <p:txBody>
+          <a:bodyPr/>
+          <a:lstStyle/>
+          <a:p>
+            <a:endParaRPr lang="cs-CZ"/>
+          </a:p>
+        </p:txBody>
+      </p:sp>
+      <p:sp>
+        <p:nvSpPr>
+          <p:cNvPr id="4" name="Zástupný symbol pro číslo snímku 3"/>
+          <p:cNvSpPr>
+            <a:spLocks noGrp="1"/>
+          </p:cNvSpPr>
+          <p:nvPr>
+            <p:ph type="sldNum" sz="quarter" idx="5"/>
+          </p:nvPr>
+        </p:nvSpPr>
+        <p:spPr/>
+        <p:txBody>
+          <a:bodyPr/>
+          <a:lstStyle/>
+          <a:p>
+            <a:fld id="{D93DBBC2-0A93-45A2-B591-A3FFF136712D}" type="slidenum">
+              <a:rPr lang="cs-CZ" smtClean="0"/>
+              <a:t>17</a:t>
+            </a:fld>
+            <a:endParaRPr lang="cs-CZ"/>
+          </a:p>
+        </p:txBody>
+      </p:sp>
+    </p:spTree>
+    <p:extLst>
+      <p:ext uri="{BB962C8B-B14F-4D97-AF65-F5344CB8AC3E}">
+        <p14:creationId xmlns:p14="http://schemas.microsoft.com/office/powerpoint/2010/main" val="3313671101"/>
+      </p:ext>
+    </p:extLst>
+  </p:cSld>
+  <p:clrMapOvr>
+    <a:masterClrMapping/>
+  </p:clrMapOvr>
+</p:notes>
+</file>
+
+<file path=ppt/notesSlides/notesSlide18.xml><?xml version="1.0" encoding="utf-8"?>
+<p:notes xmlns:a="http://schemas.openxmlformats.org/drawingml/2006/main" xmlns:r="http://schemas.openxmlformats.org/officeDocument/2006/relationships" xmlns:p="http://schemas.openxmlformats.org/presentationml/2006/main">
+  <p:cSld>
+    <p:spTree>
+      <p:nvGrpSpPr>
+        <p:cNvPr id="1" name=""/>
+        <p:cNvGrpSpPr/>
+        <p:nvPr/>
+      </p:nvGrpSpPr>
+      <p:grpSpPr>
+        <a:xfrm>
+          <a:off x="0" y="0"/>
+          <a:ext cx="0" cy="0"/>
+          <a:chOff x="0" y="0"/>
+          <a:chExt cx="0" cy="0"/>
+        </a:xfrm>
+      </p:grpSpPr>
+      <p:sp>
+        <p:nvSpPr>
+          <p:cNvPr id="2" name="Zástupný symbol pro obrázek snímku 1"/>
+          <p:cNvSpPr>
+            <a:spLocks noGrp="1" noRot="1" noChangeAspect="1"/>
+          </p:cNvSpPr>
+          <p:nvPr>
+            <p:ph type="sldImg"/>
+          </p:nvPr>
+        </p:nvSpPr>
+        <p:spPr/>
+      </p:sp>
+      <p:sp>
+        <p:nvSpPr>
+          <p:cNvPr id="3" name="Zástupný symbol pro poznámky 2"/>
+          <p:cNvSpPr>
+            <a:spLocks noGrp="1"/>
+          </p:cNvSpPr>
+          <p:nvPr>
+            <p:ph type="body" idx="1"/>
+          </p:nvPr>
+        </p:nvSpPr>
+        <p:spPr/>
+        <p:txBody>
+          <a:bodyPr/>
+          <a:lstStyle/>
+          <a:p>
+            <a:endParaRPr lang="cs-CZ"/>
+          </a:p>
+        </p:txBody>
+      </p:sp>
+      <p:sp>
+        <p:nvSpPr>
+          <p:cNvPr id="4" name="Zástupný symbol pro číslo snímku 3"/>
+          <p:cNvSpPr>
+            <a:spLocks noGrp="1"/>
+          </p:cNvSpPr>
+          <p:nvPr>
+            <p:ph type="sldNum" sz="quarter" idx="5"/>
+          </p:nvPr>
+        </p:nvSpPr>
+        <p:spPr/>
+        <p:txBody>
+          <a:bodyPr/>
+          <a:lstStyle/>
+          <a:p>
+            <a:fld id="{D93DBBC2-0A93-45A2-B591-A3FFF136712D}" type="slidenum">
+              <a:rPr lang="cs-CZ" smtClean="0"/>
+              <a:t>18</a:t>
+            </a:fld>
+            <a:endParaRPr lang="cs-CZ"/>
+          </a:p>
+        </p:txBody>
+      </p:sp>
+    </p:spTree>
+    <p:extLst>
+      <p:ext uri="{BB962C8B-B14F-4D97-AF65-F5344CB8AC3E}">
+        <p14:creationId xmlns:p14="http://schemas.microsoft.com/office/powerpoint/2010/main" val="1736462805"/>
+      </p:ext>
+    </p:extLst>
+  </p:cSld>
+  <p:clrMapOvr>
+    <a:masterClrMapping/>
+  </p:clrMapOvr>
+</p:notes>
+</file>
+
+<file path=ppt/notesSlides/notesSlide19.xml><?xml version="1.0" encoding="utf-8"?>
+<p:notes xmlns:a="http://schemas.openxmlformats.org/drawingml/2006/main" xmlns:r="http://schemas.openxmlformats.org/officeDocument/2006/relationships" xmlns:p="http://schemas.openxmlformats.org/presentationml/2006/main">
+  <p:cSld>
+    <p:spTree>
+      <p:nvGrpSpPr>
+        <p:cNvPr id="1" name=""/>
+        <p:cNvGrpSpPr/>
+        <p:nvPr/>
+      </p:nvGrpSpPr>
+      <p:grpSpPr>
+        <a:xfrm>
+          <a:off x="0" y="0"/>
+          <a:ext cx="0" cy="0"/>
+          <a:chOff x="0" y="0"/>
+          <a:chExt cx="0" cy="0"/>
+        </a:xfrm>
+      </p:grpSpPr>
+      <p:sp>
+        <p:nvSpPr>
+          <p:cNvPr id="2" name="Zástupný symbol pro obrázek snímku 1"/>
+          <p:cNvSpPr>
+            <a:spLocks noGrp="1" noRot="1" noChangeAspect="1"/>
+          </p:cNvSpPr>
+          <p:nvPr>
+            <p:ph type="sldImg"/>
+          </p:nvPr>
+        </p:nvSpPr>
+        <p:spPr/>
+      </p:sp>
+      <p:sp>
+        <p:nvSpPr>
+          <p:cNvPr id="3" name="Zástupný symbol pro poznámky 2"/>
+          <p:cNvSpPr>
+            <a:spLocks noGrp="1"/>
+          </p:cNvSpPr>
+          <p:nvPr>
+            <p:ph type="body" idx="1"/>
+          </p:nvPr>
+        </p:nvSpPr>
+        <p:spPr/>
+        <p:txBody>
+          <a:bodyPr/>
+          <a:lstStyle/>
+          <a:p>
+            <a:endParaRPr lang="cs-CZ"/>
+          </a:p>
+        </p:txBody>
+      </p:sp>
+      <p:sp>
+        <p:nvSpPr>
+          <p:cNvPr id="4" name="Zástupný symbol pro číslo snímku 3"/>
+          <p:cNvSpPr>
+            <a:spLocks noGrp="1"/>
+          </p:cNvSpPr>
+          <p:nvPr>
+            <p:ph type="sldNum" sz="quarter" idx="5"/>
+          </p:nvPr>
+        </p:nvSpPr>
+        <p:spPr/>
+        <p:txBody>
+          <a:bodyPr/>
+          <a:lstStyle/>
+          <a:p>
+            <a:fld id="{D93DBBC2-0A93-45A2-B591-A3FFF136712D}" type="slidenum">
+              <a:rPr lang="cs-CZ" smtClean="0"/>
+              <a:t>19</a:t>
+            </a:fld>
+            <a:endParaRPr lang="cs-CZ"/>
+          </a:p>
+        </p:txBody>
+      </p:sp>
+    </p:spTree>
+    <p:extLst>
+      <p:ext uri="{BB962C8B-B14F-4D97-AF65-F5344CB8AC3E}">
+        <p14:creationId xmlns:p14="http://schemas.microsoft.com/office/powerpoint/2010/main" val="1695863202"/>
       </p:ext>
     </p:extLst>
   </p:cSld>
@@ -644,6 +1461,426 @@
           <a:bodyPr/>
           <a:lstStyle/>
           <a:p>
+            <a:endParaRPr lang="cs-CZ"/>
+          </a:p>
+        </p:txBody>
+      </p:sp>
+      <p:sp>
+        <p:nvSpPr>
+          <p:cNvPr id="4" name="Zástupný symbol pro číslo snímku 3"/>
+          <p:cNvSpPr>
+            <a:spLocks noGrp="1"/>
+          </p:cNvSpPr>
+          <p:nvPr>
+            <p:ph type="sldNum" sz="quarter" idx="5"/>
+          </p:nvPr>
+        </p:nvSpPr>
+        <p:spPr/>
+        <p:txBody>
+          <a:bodyPr/>
+          <a:lstStyle/>
+          <a:p>
+            <a:fld id="{D93DBBC2-0A93-45A2-B591-A3FFF136712D}" type="slidenum">
+              <a:rPr lang="cs-CZ" smtClean="0"/>
+              <a:t>2</a:t>
+            </a:fld>
+            <a:endParaRPr lang="cs-CZ"/>
+          </a:p>
+        </p:txBody>
+      </p:sp>
+    </p:spTree>
+    <p:extLst>
+      <p:ext uri="{BB962C8B-B14F-4D97-AF65-F5344CB8AC3E}">
+        <p14:creationId xmlns:p14="http://schemas.microsoft.com/office/powerpoint/2010/main" val="3464131457"/>
+      </p:ext>
+    </p:extLst>
+  </p:cSld>
+  <p:clrMapOvr>
+    <a:masterClrMapping/>
+  </p:clrMapOvr>
+</p:notes>
+</file>
+
+<file path=ppt/notesSlides/notesSlide20.xml><?xml version="1.0" encoding="utf-8"?>
+<p:notes xmlns:a="http://schemas.openxmlformats.org/drawingml/2006/main" xmlns:r="http://schemas.openxmlformats.org/officeDocument/2006/relationships" xmlns:p="http://schemas.openxmlformats.org/presentationml/2006/main">
+  <p:cSld>
+    <p:spTree>
+      <p:nvGrpSpPr>
+        <p:cNvPr id="1" name=""/>
+        <p:cNvGrpSpPr/>
+        <p:nvPr/>
+      </p:nvGrpSpPr>
+      <p:grpSpPr>
+        <a:xfrm>
+          <a:off x="0" y="0"/>
+          <a:ext cx="0" cy="0"/>
+          <a:chOff x="0" y="0"/>
+          <a:chExt cx="0" cy="0"/>
+        </a:xfrm>
+      </p:grpSpPr>
+      <p:sp>
+        <p:nvSpPr>
+          <p:cNvPr id="2" name="Zástupný symbol pro obrázek snímku 1"/>
+          <p:cNvSpPr>
+            <a:spLocks noGrp="1" noRot="1" noChangeAspect="1"/>
+          </p:cNvSpPr>
+          <p:nvPr>
+            <p:ph type="sldImg"/>
+          </p:nvPr>
+        </p:nvSpPr>
+        <p:spPr/>
+      </p:sp>
+      <p:sp>
+        <p:nvSpPr>
+          <p:cNvPr id="3" name="Zástupný symbol pro poznámky 2"/>
+          <p:cNvSpPr>
+            <a:spLocks noGrp="1"/>
+          </p:cNvSpPr>
+          <p:nvPr>
+            <p:ph type="body" idx="1"/>
+          </p:nvPr>
+        </p:nvSpPr>
+        <p:spPr/>
+        <p:txBody>
+          <a:bodyPr/>
+          <a:lstStyle/>
+          <a:p>
+            <a:endParaRPr lang="cs-CZ"/>
+          </a:p>
+        </p:txBody>
+      </p:sp>
+      <p:sp>
+        <p:nvSpPr>
+          <p:cNvPr id="4" name="Zástupný symbol pro číslo snímku 3"/>
+          <p:cNvSpPr>
+            <a:spLocks noGrp="1"/>
+          </p:cNvSpPr>
+          <p:nvPr>
+            <p:ph type="sldNum" sz="quarter" idx="5"/>
+          </p:nvPr>
+        </p:nvSpPr>
+        <p:spPr/>
+        <p:txBody>
+          <a:bodyPr/>
+          <a:lstStyle/>
+          <a:p>
+            <a:fld id="{D93DBBC2-0A93-45A2-B591-A3FFF136712D}" type="slidenum">
+              <a:rPr lang="cs-CZ" smtClean="0"/>
+              <a:t>20</a:t>
+            </a:fld>
+            <a:endParaRPr lang="cs-CZ"/>
+          </a:p>
+        </p:txBody>
+      </p:sp>
+    </p:spTree>
+    <p:extLst>
+      <p:ext uri="{BB962C8B-B14F-4D97-AF65-F5344CB8AC3E}">
+        <p14:creationId xmlns:p14="http://schemas.microsoft.com/office/powerpoint/2010/main" val="4138080609"/>
+      </p:ext>
+    </p:extLst>
+  </p:cSld>
+  <p:clrMapOvr>
+    <a:masterClrMapping/>
+  </p:clrMapOvr>
+</p:notes>
+</file>
+
+<file path=ppt/notesSlides/notesSlide21.xml><?xml version="1.0" encoding="utf-8"?>
+<p:notes xmlns:a="http://schemas.openxmlformats.org/drawingml/2006/main" xmlns:r="http://schemas.openxmlformats.org/officeDocument/2006/relationships" xmlns:p="http://schemas.openxmlformats.org/presentationml/2006/main">
+  <p:cSld>
+    <p:spTree>
+      <p:nvGrpSpPr>
+        <p:cNvPr id="1" name=""/>
+        <p:cNvGrpSpPr/>
+        <p:nvPr/>
+      </p:nvGrpSpPr>
+      <p:grpSpPr>
+        <a:xfrm>
+          <a:off x="0" y="0"/>
+          <a:ext cx="0" cy="0"/>
+          <a:chOff x="0" y="0"/>
+          <a:chExt cx="0" cy="0"/>
+        </a:xfrm>
+      </p:grpSpPr>
+      <p:sp>
+        <p:nvSpPr>
+          <p:cNvPr id="2" name="Zástupný symbol pro obrázek snímku 1"/>
+          <p:cNvSpPr>
+            <a:spLocks noGrp="1" noRot="1" noChangeAspect="1"/>
+          </p:cNvSpPr>
+          <p:nvPr>
+            <p:ph type="sldImg"/>
+          </p:nvPr>
+        </p:nvSpPr>
+        <p:spPr/>
+      </p:sp>
+      <p:sp>
+        <p:nvSpPr>
+          <p:cNvPr id="3" name="Zástupný symbol pro poznámky 2"/>
+          <p:cNvSpPr>
+            <a:spLocks noGrp="1"/>
+          </p:cNvSpPr>
+          <p:nvPr>
+            <p:ph type="body" idx="1"/>
+          </p:nvPr>
+        </p:nvSpPr>
+        <p:spPr/>
+        <p:txBody>
+          <a:bodyPr/>
+          <a:lstStyle/>
+          <a:p>
+            <a:endParaRPr lang="cs-CZ"/>
+          </a:p>
+        </p:txBody>
+      </p:sp>
+      <p:sp>
+        <p:nvSpPr>
+          <p:cNvPr id="4" name="Zástupný symbol pro číslo snímku 3"/>
+          <p:cNvSpPr>
+            <a:spLocks noGrp="1"/>
+          </p:cNvSpPr>
+          <p:nvPr>
+            <p:ph type="sldNum" sz="quarter" idx="5"/>
+          </p:nvPr>
+        </p:nvSpPr>
+        <p:spPr/>
+        <p:txBody>
+          <a:bodyPr/>
+          <a:lstStyle/>
+          <a:p>
+            <a:fld id="{D93DBBC2-0A93-45A2-B591-A3FFF136712D}" type="slidenum">
+              <a:rPr lang="cs-CZ" smtClean="0"/>
+              <a:t>21</a:t>
+            </a:fld>
+            <a:endParaRPr lang="cs-CZ"/>
+          </a:p>
+        </p:txBody>
+      </p:sp>
+    </p:spTree>
+    <p:extLst>
+      <p:ext uri="{BB962C8B-B14F-4D97-AF65-F5344CB8AC3E}">
+        <p14:creationId xmlns:p14="http://schemas.microsoft.com/office/powerpoint/2010/main" val="2404188687"/>
+      </p:ext>
+    </p:extLst>
+  </p:cSld>
+  <p:clrMapOvr>
+    <a:masterClrMapping/>
+  </p:clrMapOvr>
+</p:notes>
+</file>
+
+<file path=ppt/notesSlides/notesSlide22.xml><?xml version="1.0" encoding="utf-8"?>
+<p:notes xmlns:a="http://schemas.openxmlformats.org/drawingml/2006/main" xmlns:r="http://schemas.openxmlformats.org/officeDocument/2006/relationships" xmlns:p="http://schemas.openxmlformats.org/presentationml/2006/main">
+  <p:cSld>
+    <p:spTree>
+      <p:nvGrpSpPr>
+        <p:cNvPr id="1" name=""/>
+        <p:cNvGrpSpPr/>
+        <p:nvPr/>
+      </p:nvGrpSpPr>
+      <p:grpSpPr>
+        <a:xfrm>
+          <a:off x="0" y="0"/>
+          <a:ext cx="0" cy="0"/>
+          <a:chOff x="0" y="0"/>
+          <a:chExt cx="0" cy="0"/>
+        </a:xfrm>
+      </p:grpSpPr>
+      <p:sp>
+        <p:nvSpPr>
+          <p:cNvPr id="2" name="Zástupný symbol pro obrázek snímku 1"/>
+          <p:cNvSpPr>
+            <a:spLocks noGrp="1" noRot="1" noChangeAspect="1"/>
+          </p:cNvSpPr>
+          <p:nvPr>
+            <p:ph type="sldImg"/>
+          </p:nvPr>
+        </p:nvSpPr>
+        <p:spPr/>
+      </p:sp>
+      <p:sp>
+        <p:nvSpPr>
+          <p:cNvPr id="3" name="Zástupný symbol pro poznámky 2"/>
+          <p:cNvSpPr>
+            <a:spLocks noGrp="1"/>
+          </p:cNvSpPr>
+          <p:nvPr>
+            <p:ph type="body" idx="1"/>
+          </p:nvPr>
+        </p:nvSpPr>
+        <p:spPr/>
+        <p:txBody>
+          <a:bodyPr/>
+          <a:lstStyle/>
+          <a:p>
+            <a:endParaRPr lang="cs-CZ"/>
+          </a:p>
+        </p:txBody>
+      </p:sp>
+      <p:sp>
+        <p:nvSpPr>
+          <p:cNvPr id="4" name="Zástupný symbol pro číslo snímku 3"/>
+          <p:cNvSpPr>
+            <a:spLocks noGrp="1"/>
+          </p:cNvSpPr>
+          <p:nvPr>
+            <p:ph type="sldNum" sz="quarter" idx="5"/>
+          </p:nvPr>
+        </p:nvSpPr>
+        <p:spPr/>
+        <p:txBody>
+          <a:bodyPr/>
+          <a:lstStyle/>
+          <a:p>
+            <a:fld id="{D93DBBC2-0A93-45A2-B591-A3FFF136712D}" type="slidenum">
+              <a:rPr lang="cs-CZ" smtClean="0"/>
+              <a:t>22</a:t>
+            </a:fld>
+            <a:endParaRPr lang="cs-CZ"/>
+          </a:p>
+        </p:txBody>
+      </p:sp>
+    </p:spTree>
+    <p:extLst>
+      <p:ext uri="{BB962C8B-B14F-4D97-AF65-F5344CB8AC3E}">
+        <p14:creationId xmlns:p14="http://schemas.microsoft.com/office/powerpoint/2010/main" val="494646347"/>
+      </p:ext>
+    </p:extLst>
+  </p:cSld>
+  <p:clrMapOvr>
+    <a:masterClrMapping/>
+  </p:clrMapOvr>
+</p:notes>
+</file>
+
+<file path=ppt/notesSlides/notesSlide23.xml><?xml version="1.0" encoding="utf-8"?>
+<p:notes xmlns:a="http://schemas.openxmlformats.org/drawingml/2006/main" xmlns:r="http://schemas.openxmlformats.org/officeDocument/2006/relationships" xmlns:p="http://schemas.openxmlformats.org/presentationml/2006/main">
+  <p:cSld>
+    <p:spTree>
+      <p:nvGrpSpPr>
+        <p:cNvPr id="1" name=""/>
+        <p:cNvGrpSpPr/>
+        <p:nvPr/>
+      </p:nvGrpSpPr>
+      <p:grpSpPr>
+        <a:xfrm>
+          <a:off x="0" y="0"/>
+          <a:ext cx="0" cy="0"/>
+          <a:chOff x="0" y="0"/>
+          <a:chExt cx="0" cy="0"/>
+        </a:xfrm>
+      </p:grpSpPr>
+      <p:sp>
+        <p:nvSpPr>
+          <p:cNvPr id="2" name="Zástupný symbol pro obrázek snímku 1"/>
+          <p:cNvSpPr>
+            <a:spLocks noGrp="1" noRot="1" noChangeAspect="1"/>
+          </p:cNvSpPr>
+          <p:nvPr>
+            <p:ph type="sldImg"/>
+          </p:nvPr>
+        </p:nvSpPr>
+        <p:spPr/>
+      </p:sp>
+      <p:sp>
+        <p:nvSpPr>
+          <p:cNvPr id="3" name="Zástupný symbol pro poznámky 2"/>
+          <p:cNvSpPr>
+            <a:spLocks noGrp="1"/>
+          </p:cNvSpPr>
+          <p:nvPr>
+            <p:ph type="body" idx="1"/>
+          </p:nvPr>
+        </p:nvSpPr>
+        <p:spPr/>
+        <p:txBody>
+          <a:bodyPr/>
+          <a:lstStyle/>
+          <a:p>
+            <a:endParaRPr lang="cs-CZ"/>
+          </a:p>
+        </p:txBody>
+      </p:sp>
+      <p:sp>
+        <p:nvSpPr>
+          <p:cNvPr id="4" name="Zástupný symbol pro číslo snímku 3"/>
+          <p:cNvSpPr>
+            <a:spLocks noGrp="1"/>
+          </p:cNvSpPr>
+          <p:nvPr>
+            <p:ph type="sldNum" sz="quarter" idx="5"/>
+          </p:nvPr>
+        </p:nvSpPr>
+        <p:spPr/>
+        <p:txBody>
+          <a:bodyPr/>
+          <a:lstStyle/>
+          <a:p>
+            <a:fld id="{D93DBBC2-0A93-45A2-B591-A3FFF136712D}" type="slidenum">
+              <a:rPr lang="cs-CZ" smtClean="0"/>
+              <a:t>23</a:t>
+            </a:fld>
+            <a:endParaRPr lang="cs-CZ"/>
+          </a:p>
+        </p:txBody>
+      </p:sp>
+    </p:spTree>
+    <p:extLst>
+      <p:ext uri="{BB962C8B-B14F-4D97-AF65-F5344CB8AC3E}">
+        <p14:creationId xmlns:p14="http://schemas.microsoft.com/office/powerpoint/2010/main" val="154028433"/>
+      </p:ext>
+    </p:extLst>
+  </p:cSld>
+  <p:clrMapOvr>
+    <a:masterClrMapping/>
+  </p:clrMapOvr>
+</p:notes>
+</file>
+
+<file path=ppt/notesSlides/notesSlide24.xml><?xml version="1.0" encoding="utf-8"?>
+<p:notes xmlns:a="http://schemas.openxmlformats.org/drawingml/2006/main" xmlns:r="http://schemas.openxmlformats.org/officeDocument/2006/relationships" xmlns:p="http://schemas.openxmlformats.org/presentationml/2006/main">
+  <p:cSld>
+    <p:spTree>
+      <p:nvGrpSpPr>
+        <p:cNvPr id="1" name=""/>
+        <p:cNvGrpSpPr/>
+        <p:nvPr/>
+      </p:nvGrpSpPr>
+      <p:grpSpPr>
+        <a:xfrm>
+          <a:off x="0" y="0"/>
+          <a:ext cx="0" cy="0"/>
+          <a:chOff x="0" y="0"/>
+          <a:chExt cx="0" cy="0"/>
+        </a:xfrm>
+      </p:grpSpPr>
+      <p:sp>
+        <p:nvSpPr>
+          <p:cNvPr id="2" name="Zástupný symbol pro obrázek snímku 1"/>
+          <p:cNvSpPr>
+            <a:spLocks noGrp="1" noRot="1" noChangeAspect="1"/>
+          </p:cNvSpPr>
+          <p:nvPr>
+            <p:ph type="sldImg"/>
+          </p:nvPr>
+        </p:nvSpPr>
+        <p:spPr/>
+      </p:sp>
+      <p:sp>
+        <p:nvSpPr>
+          <p:cNvPr id="3" name="Zástupný symbol pro poznámky 2"/>
+          <p:cNvSpPr>
+            <a:spLocks noGrp="1"/>
+          </p:cNvSpPr>
+          <p:nvPr>
+            <p:ph type="body" idx="1"/>
+          </p:nvPr>
+        </p:nvSpPr>
+        <p:spPr/>
+        <p:txBody>
+          <a:bodyPr/>
+          <a:lstStyle/>
+          <a:p>
             <a:r>
               <a:rPr lang="cs-CZ" dirty="0">
                 <a:hlinkClick r:id="rId3"/>
@@ -668,6 +1905,129 @@
               </a:rPr>
               <a:t>https://docs.github.com/en/authentication/keeping-your-account-and-data-secure/creating-a-personal-access-token</a:t>
             </a:r>
+            <a:endParaRPr lang="cs-CZ" dirty="0"/>
+          </a:p>
+          <a:p>
+            <a:endParaRPr lang="cs-CZ" dirty="0"/>
+          </a:p>
+        </p:txBody>
+      </p:sp>
+      <p:sp>
+        <p:nvSpPr>
+          <p:cNvPr id="4" name="Zástupný symbol pro číslo snímku 3"/>
+          <p:cNvSpPr>
+            <a:spLocks noGrp="1"/>
+          </p:cNvSpPr>
+          <p:nvPr>
+            <p:ph type="sldNum" sz="quarter" idx="5"/>
+          </p:nvPr>
+        </p:nvSpPr>
+        <p:spPr/>
+        <p:txBody>
+          <a:bodyPr/>
+          <a:lstStyle/>
+          <a:p>
+            <a:fld id="{D93DBBC2-0A93-45A2-B591-A3FFF136712D}" type="slidenum">
+              <a:rPr lang="cs-CZ" smtClean="0"/>
+              <a:t>24</a:t>
+            </a:fld>
+            <a:endParaRPr lang="cs-CZ"/>
+          </a:p>
+        </p:txBody>
+      </p:sp>
+    </p:spTree>
+    <p:extLst>
+      <p:ext uri="{BB962C8B-B14F-4D97-AF65-F5344CB8AC3E}">
+        <p14:creationId xmlns:p14="http://schemas.microsoft.com/office/powerpoint/2010/main" val="536103699"/>
+      </p:ext>
+    </p:extLst>
+  </p:cSld>
+  <p:clrMapOvr>
+    <a:masterClrMapping/>
+  </p:clrMapOvr>
+</p:notes>
+</file>
+
+<file path=ppt/notesSlides/notesSlide25.xml><?xml version="1.0" encoding="utf-8"?>
+<p:notes xmlns:a="http://schemas.openxmlformats.org/drawingml/2006/main" xmlns:r="http://schemas.openxmlformats.org/officeDocument/2006/relationships" xmlns:p="http://schemas.openxmlformats.org/presentationml/2006/main">
+  <p:cSld>
+    <p:spTree>
+      <p:nvGrpSpPr>
+        <p:cNvPr id="1" name=""/>
+        <p:cNvGrpSpPr/>
+        <p:nvPr/>
+      </p:nvGrpSpPr>
+      <p:grpSpPr>
+        <a:xfrm>
+          <a:off x="0" y="0"/>
+          <a:ext cx="0" cy="0"/>
+          <a:chOff x="0" y="0"/>
+          <a:chExt cx="0" cy="0"/>
+        </a:xfrm>
+      </p:grpSpPr>
+      <p:sp>
+        <p:nvSpPr>
+          <p:cNvPr id="2" name="Zástupný symbol pro obrázek snímku 1"/>
+          <p:cNvSpPr>
+            <a:spLocks noGrp="1" noRot="1" noChangeAspect="1"/>
+          </p:cNvSpPr>
+          <p:nvPr>
+            <p:ph type="sldImg"/>
+          </p:nvPr>
+        </p:nvSpPr>
+        <p:spPr/>
+      </p:sp>
+      <p:sp>
+        <p:nvSpPr>
+          <p:cNvPr id="3" name="Zástupný symbol pro poznámky 2"/>
+          <p:cNvSpPr>
+            <a:spLocks noGrp="1"/>
+          </p:cNvSpPr>
+          <p:nvPr>
+            <p:ph type="body" idx="1"/>
+          </p:nvPr>
+        </p:nvSpPr>
+        <p:spPr/>
+        <p:txBody>
+          <a:bodyPr/>
+          <a:lstStyle/>
+          <a:p>
+            <a:r>
+              <a:rPr lang="cs-CZ" dirty="0">
+                <a:hlinkClick r:id="rId3"/>
+              </a:rPr>
+              <a:t>https://docs.github.com/en/get-started/quickstart/set-up-git</a:t>
+            </a:r>
+            <a:endParaRPr lang="cs-CZ" dirty="0"/>
+          </a:p>
+          <a:p>
+            <a:r>
+              <a:rPr lang="cs-CZ" dirty="0">
+                <a:hlinkClick r:id="rId4"/>
+              </a:rPr>
+              <a:t>https://docs.github.com/en/get-started/getting-started-with-git/about-remote-repositories#cloning-with-https-urls</a:t>
+            </a:r>
+            <a:endParaRPr lang="cs-CZ" dirty="0"/>
+          </a:p>
+          <a:p>
+            <a:r>
+              <a:rPr lang="cs-CZ" dirty="0">
+                <a:hlinkClick r:id="rId5"/>
+              </a:rPr>
+              <a:t>https://docs.github.com/en/authentication/keeping-your-account-and-data-secure/creating-a-personal-access-token</a:t>
+            </a:r>
+            <a:endParaRPr lang="cs-CZ" dirty="0"/>
+          </a:p>
+          <a:p>
+            <a:r>
+              <a:rPr lang="cs-CZ" dirty="0">
+                <a:hlinkClick r:id="rId6"/>
+              </a:rPr>
+              <a:t>https://docs.github.com/en/get-started/quickstart/github-flow</a:t>
+            </a:r>
+            <a:endParaRPr lang="cs-CZ" dirty="0"/>
+          </a:p>
+          <a:p>
             <a:endParaRPr lang="cs-CZ" dirty="0"/>
           </a:p>
           <a:p>
@@ -701,7 +2061,826 @@
     </p:spTree>
     <p:extLst>
       <p:ext uri="{BB962C8B-B14F-4D97-AF65-F5344CB8AC3E}">
+        <p14:creationId xmlns:p14="http://schemas.microsoft.com/office/powerpoint/2010/main" val="4284787112"/>
+      </p:ext>
+    </p:extLst>
+  </p:cSld>
+  <p:clrMapOvr>
+    <a:masterClrMapping/>
+  </p:clrMapOvr>
+</p:notes>
+</file>
+
+<file path=ppt/notesSlides/notesSlide26.xml><?xml version="1.0" encoding="utf-8"?>
+<p:notes xmlns:a="http://schemas.openxmlformats.org/drawingml/2006/main" xmlns:r="http://schemas.openxmlformats.org/officeDocument/2006/relationships" xmlns:p="http://schemas.openxmlformats.org/presentationml/2006/main">
+  <p:cSld>
+    <p:spTree>
+      <p:nvGrpSpPr>
+        <p:cNvPr id="1" name=""/>
+        <p:cNvGrpSpPr/>
+        <p:nvPr/>
+      </p:nvGrpSpPr>
+      <p:grpSpPr>
+        <a:xfrm>
+          <a:off x="0" y="0"/>
+          <a:ext cx="0" cy="0"/>
+          <a:chOff x="0" y="0"/>
+          <a:chExt cx="0" cy="0"/>
+        </a:xfrm>
+      </p:grpSpPr>
+      <p:sp>
+        <p:nvSpPr>
+          <p:cNvPr id="2" name="Zástupný symbol pro obrázek snímku 1"/>
+          <p:cNvSpPr>
+            <a:spLocks noGrp="1" noRot="1" noChangeAspect="1"/>
+          </p:cNvSpPr>
+          <p:nvPr>
+            <p:ph type="sldImg"/>
+          </p:nvPr>
+        </p:nvSpPr>
+        <p:spPr/>
+      </p:sp>
+      <p:sp>
+        <p:nvSpPr>
+          <p:cNvPr id="3" name="Zástupný symbol pro poznámky 2"/>
+          <p:cNvSpPr>
+            <a:spLocks noGrp="1"/>
+          </p:cNvSpPr>
+          <p:nvPr>
+            <p:ph type="body" idx="1"/>
+          </p:nvPr>
+        </p:nvSpPr>
+        <p:spPr/>
+        <p:txBody>
+          <a:bodyPr/>
+          <a:lstStyle/>
+          <a:p>
+            <a:r>
+              <a:rPr lang="cs-CZ" dirty="0">
+                <a:hlinkClick r:id="rId3"/>
+              </a:rPr>
+              <a:t>https://www.apache.org/</a:t>
+            </a:r>
+            <a:endParaRPr lang="cs-CZ" dirty="0"/>
+          </a:p>
+          <a:p>
+            <a:r>
+              <a:rPr lang="cs-CZ" dirty="0">
+                <a:hlinkClick r:id="rId4"/>
+              </a:rPr>
+              <a:t>https://git-scm.com/book/en/v2/GitHub-Contributing-to-a-Project</a:t>
+            </a:r>
+            <a:endParaRPr lang="cs-CZ" dirty="0"/>
+          </a:p>
+          <a:p>
+            <a:r>
+              <a:rPr lang="cs-CZ" dirty="0">
+                <a:hlinkClick r:id="rId5"/>
+              </a:rPr>
+              <a:t>https://choosealicense.com/</a:t>
+            </a:r>
+            <a:endParaRPr lang="cs-CZ" dirty="0"/>
+          </a:p>
+          <a:p>
+            <a:r>
+              <a:rPr lang="cs-CZ" dirty="0">
+                <a:hlinkClick r:id="rId6"/>
+              </a:rPr>
+              <a:t>https://atom.io/</a:t>
+            </a:r>
+            <a:endParaRPr lang="cs-CZ" dirty="0"/>
+          </a:p>
+          <a:p>
+            <a:r>
+              <a:rPr lang="cs-CZ" dirty="0">
+                <a:hlinkClick r:id="rId7"/>
+              </a:rPr>
+              <a:t>https://code.visualstudio.com/</a:t>
+            </a:r>
+            <a:endParaRPr lang="cs-CZ" dirty="0"/>
+          </a:p>
+          <a:p>
+            <a:endParaRPr lang="cs-CZ" dirty="0"/>
+          </a:p>
+        </p:txBody>
+      </p:sp>
+      <p:sp>
+        <p:nvSpPr>
+          <p:cNvPr id="4" name="Zástupný symbol pro číslo snímku 3"/>
+          <p:cNvSpPr>
+            <a:spLocks noGrp="1"/>
+          </p:cNvSpPr>
+          <p:nvPr>
+            <p:ph type="sldNum" sz="quarter" idx="5"/>
+          </p:nvPr>
+        </p:nvSpPr>
+        <p:spPr/>
+        <p:txBody>
+          <a:bodyPr/>
+          <a:lstStyle/>
+          <a:p>
+            <a:fld id="{D93DBBC2-0A93-45A2-B591-A3FFF136712D}" type="slidenum">
+              <a:rPr lang="cs-CZ" smtClean="0"/>
+              <a:t>26</a:t>
+            </a:fld>
+            <a:endParaRPr lang="cs-CZ"/>
+          </a:p>
+        </p:txBody>
+      </p:sp>
+    </p:spTree>
+    <p:extLst>
+      <p:ext uri="{BB962C8B-B14F-4D97-AF65-F5344CB8AC3E}">
         <p14:creationId xmlns:p14="http://schemas.microsoft.com/office/powerpoint/2010/main" val="2922411109"/>
+      </p:ext>
+    </p:extLst>
+  </p:cSld>
+  <p:clrMapOvr>
+    <a:masterClrMapping/>
+  </p:clrMapOvr>
+</p:notes>
+</file>
+
+<file path=ppt/notesSlides/notesSlide27.xml><?xml version="1.0" encoding="utf-8"?>
+<p:notes xmlns:a="http://schemas.openxmlformats.org/drawingml/2006/main" xmlns:r="http://schemas.openxmlformats.org/officeDocument/2006/relationships" xmlns:p="http://schemas.openxmlformats.org/presentationml/2006/main">
+  <p:cSld>
+    <p:spTree>
+      <p:nvGrpSpPr>
+        <p:cNvPr id="1" name=""/>
+        <p:cNvGrpSpPr/>
+        <p:nvPr/>
+      </p:nvGrpSpPr>
+      <p:grpSpPr>
+        <a:xfrm>
+          <a:off x="0" y="0"/>
+          <a:ext cx="0" cy="0"/>
+          <a:chOff x="0" y="0"/>
+          <a:chExt cx="0" cy="0"/>
+        </a:xfrm>
+      </p:grpSpPr>
+      <p:sp>
+        <p:nvSpPr>
+          <p:cNvPr id="2" name="Zástupný symbol pro obrázek snímku 1"/>
+          <p:cNvSpPr>
+            <a:spLocks noGrp="1" noRot="1" noChangeAspect="1"/>
+          </p:cNvSpPr>
+          <p:nvPr>
+            <p:ph type="sldImg"/>
+          </p:nvPr>
+        </p:nvSpPr>
+        <p:spPr/>
+      </p:sp>
+      <p:sp>
+        <p:nvSpPr>
+          <p:cNvPr id="3" name="Zástupný symbol pro poznámky 2"/>
+          <p:cNvSpPr>
+            <a:spLocks noGrp="1"/>
+          </p:cNvSpPr>
+          <p:nvPr>
+            <p:ph type="body" idx="1"/>
+          </p:nvPr>
+        </p:nvSpPr>
+        <p:spPr/>
+        <p:txBody>
+          <a:bodyPr/>
+          <a:lstStyle/>
+          <a:p>
+            <a:endParaRPr lang="cs-CZ"/>
+          </a:p>
+        </p:txBody>
+      </p:sp>
+      <p:sp>
+        <p:nvSpPr>
+          <p:cNvPr id="4" name="Zástupný symbol pro číslo snímku 3"/>
+          <p:cNvSpPr>
+            <a:spLocks noGrp="1"/>
+          </p:cNvSpPr>
+          <p:nvPr>
+            <p:ph type="sldNum" sz="quarter" idx="5"/>
+          </p:nvPr>
+        </p:nvSpPr>
+        <p:spPr/>
+        <p:txBody>
+          <a:bodyPr/>
+          <a:lstStyle/>
+          <a:p>
+            <a:fld id="{D93DBBC2-0A93-45A2-B591-A3FFF136712D}" type="slidenum">
+              <a:rPr lang="cs-CZ" smtClean="0"/>
+              <a:t>27</a:t>
+            </a:fld>
+            <a:endParaRPr lang="cs-CZ"/>
+          </a:p>
+        </p:txBody>
+      </p:sp>
+    </p:spTree>
+    <p:extLst>
+      <p:ext uri="{BB962C8B-B14F-4D97-AF65-F5344CB8AC3E}">
+        <p14:creationId xmlns:p14="http://schemas.microsoft.com/office/powerpoint/2010/main" val="3192880559"/>
+      </p:ext>
+    </p:extLst>
+  </p:cSld>
+  <p:clrMapOvr>
+    <a:masterClrMapping/>
+  </p:clrMapOvr>
+</p:notes>
+</file>
+
+<file path=ppt/notesSlides/notesSlide3.xml><?xml version="1.0" encoding="utf-8"?>
+<p:notes xmlns:a="http://schemas.openxmlformats.org/drawingml/2006/main" xmlns:r="http://schemas.openxmlformats.org/officeDocument/2006/relationships" xmlns:p="http://schemas.openxmlformats.org/presentationml/2006/main">
+  <p:cSld>
+    <p:spTree>
+      <p:nvGrpSpPr>
+        <p:cNvPr id="1" name=""/>
+        <p:cNvGrpSpPr/>
+        <p:nvPr/>
+      </p:nvGrpSpPr>
+      <p:grpSpPr>
+        <a:xfrm>
+          <a:off x="0" y="0"/>
+          <a:ext cx="0" cy="0"/>
+          <a:chOff x="0" y="0"/>
+          <a:chExt cx="0" cy="0"/>
+        </a:xfrm>
+      </p:grpSpPr>
+      <p:sp>
+        <p:nvSpPr>
+          <p:cNvPr id="2" name="Zástupný symbol pro obrázek snímku 1"/>
+          <p:cNvSpPr>
+            <a:spLocks noGrp="1" noRot="1" noChangeAspect="1"/>
+          </p:cNvSpPr>
+          <p:nvPr>
+            <p:ph type="sldImg"/>
+          </p:nvPr>
+        </p:nvSpPr>
+        <p:spPr/>
+      </p:sp>
+      <p:sp>
+        <p:nvSpPr>
+          <p:cNvPr id="3" name="Zástupný symbol pro poznámky 2"/>
+          <p:cNvSpPr>
+            <a:spLocks noGrp="1"/>
+          </p:cNvSpPr>
+          <p:nvPr>
+            <p:ph type="body" idx="1"/>
+          </p:nvPr>
+        </p:nvSpPr>
+        <p:spPr/>
+        <p:txBody>
+          <a:bodyPr/>
+          <a:lstStyle/>
+          <a:p>
+            <a:endParaRPr lang="cs-CZ"/>
+          </a:p>
+        </p:txBody>
+      </p:sp>
+      <p:sp>
+        <p:nvSpPr>
+          <p:cNvPr id="4" name="Zástupný symbol pro číslo snímku 3"/>
+          <p:cNvSpPr>
+            <a:spLocks noGrp="1"/>
+          </p:cNvSpPr>
+          <p:nvPr>
+            <p:ph type="sldNum" sz="quarter" idx="5"/>
+          </p:nvPr>
+        </p:nvSpPr>
+        <p:spPr/>
+        <p:txBody>
+          <a:bodyPr/>
+          <a:lstStyle/>
+          <a:p>
+            <a:fld id="{D93DBBC2-0A93-45A2-B591-A3FFF136712D}" type="slidenum">
+              <a:rPr lang="cs-CZ" smtClean="0"/>
+              <a:t>3</a:t>
+            </a:fld>
+            <a:endParaRPr lang="cs-CZ"/>
+          </a:p>
+        </p:txBody>
+      </p:sp>
+    </p:spTree>
+    <p:extLst>
+      <p:ext uri="{BB962C8B-B14F-4D97-AF65-F5344CB8AC3E}">
+        <p14:creationId xmlns:p14="http://schemas.microsoft.com/office/powerpoint/2010/main" val="407714416"/>
+      </p:ext>
+    </p:extLst>
+  </p:cSld>
+  <p:clrMapOvr>
+    <a:masterClrMapping/>
+  </p:clrMapOvr>
+</p:notes>
+</file>
+
+<file path=ppt/notesSlides/notesSlide4.xml><?xml version="1.0" encoding="utf-8"?>
+<p:notes xmlns:a="http://schemas.openxmlformats.org/drawingml/2006/main" xmlns:r="http://schemas.openxmlformats.org/officeDocument/2006/relationships" xmlns:p="http://schemas.openxmlformats.org/presentationml/2006/main">
+  <p:cSld>
+    <p:spTree>
+      <p:nvGrpSpPr>
+        <p:cNvPr id="1" name=""/>
+        <p:cNvGrpSpPr/>
+        <p:nvPr/>
+      </p:nvGrpSpPr>
+      <p:grpSpPr>
+        <a:xfrm>
+          <a:off x="0" y="0"/>
+          <a:ext cx="0" cy="0"/>
+          <a:chOff x="0" y="0"/>
+          <a:chExt cx="0" cy="0"/>
+        </a:xfrm>
+      </p:grpSpPr>
+      <p:sp>
+        <p:nvSpPr>
+          <p:cNvPr id="2" name="Zástupný symbol pro obrázek snímku 1"/>
+          <p:cNvSpPr>
+            <a:spLocks noGrp="1" noRot="1" noChangeAspect="1"/>
+          </p:cNvSpPr>
+          <p:nvPr>
+            <p:ph type="sldImg"/>
+          </p:nvPr>
+        </p:nvSpPr>
+        <p:spPr/>
+      </p:sp>
+      <p:sp>
+        <p:nvSpPr>
+          <p:cNvPr id="3" name="Zástupný symbol pro poznámky 2"/>
+          <p:cNvSpPr>
+            <a:spLocks noGrp="1"/>
+          </p:cNvSpPr>
+          <p:nvPr>
+            <p:ph type="body" idx="1"/>
+          </p:nvPr>
+        </p:nvSpPr>
+        <p:spPr/>
+        <p:txBody>
+          <a:bodyPr/>
+          <a:lstStyle/>
+          <a:p>
+            <a:endParaRPr lang="cs-CZ"/>
+          </a:p>
+        </p:txBody>
+      </p:sp>
+      <p:sp>
+        <p:nvSpPr>
+          <p:cNvPr id="4" name="Zástupný symbol pro číslo snímku 3"/>
+          <p:cNvSpPr>
+            <a:spLocks noGrp="1"/>
+          </p:cNvSpPr>
+          <p:nvPr>
+            <p:ph type="sldNum" sz="quarter" idx="5"/>
+          </p:nvPr>
+        </p:nvSpPr>
+        <p:spPr/>
+        <p:txBody>
+          <a:bodyPr/>
+          <a:lstStyle/>
+          <a:p>
+            <a:fld id="{D93DBBC2-0A93-45A2-B591-A3FFF136712D}" type="slidenum">
+              <a:rPr lang="cs-CZ" smtClean="0"/>
+              <a:t>4</a:t>
+            </a:fld>
+            <a:endParaRPr lang="cs-CZ"/>
+          </a:p>
+        </p:txBody>
+      </p:sp>
+    </p:spTree>
+    <p:extLst>
+      <p:ext uri="{BB962C8B-B14F-4D97-AF65-F5344CB8AC3E}">
+        <p14:creationId xmlns:p14="http://schemas.microsoft.com/office/powerpoint/2010/main" val="4126587311"/>
+      </p:ext>
+    </p:extLst>
+  </p:cSld>
+  <p:clrMapOvr>
+    <a:masterClrMapping/>
+  </p:clrMapOvr>
+</p:notes>
+</file>
+
+<file path=ppt/notesSlides/notesSlide5.xml><?xml version="1.0" encoding="utf-8"?>
+<p:notes xmlns:a="http://schemas.openxmlformats.org/drawingml/2006/main" xmlns:r="http://schemas.openxmlformats.org/officeDocument/2006/relationships" xmlns:p="http://schemas.openxmlformats.org/presentationml/2006/main">
+  <p:cSld>
+    <p:spTree>
+      <p:nvGrpSpPr>
+        <p:cNvPr id="1" name=""/>
+        <p:cNvGrpSpPr/>
+        <p:nvPr/>
+      </p:nvGrpSpPr>
+      <p:grpSpPr>
+        <a:xfrm>
+          <a:off x="0" y="0"/>
+          <a:ext cx="0" cy="0"/>
+          <a:chOff x="0" y="0"/>
+          <a:chExt cx="0" cy="0"/>
+        </a:xfrm>
+      </p:grpSpPr>
+      <p:sp>
+        <p:nvSpPr>
+          <p:cNvPr id="2" name="Zástupný symbol pro obrázek snímku 1"/>
+          <p:cNvSpPr>
+            <a:spLocks noGrp="1" noRot="1" noChangeAspect="1"/>
+          </p:cNvSpPr>
+          <p:nvPr>
+            <p:ph type="sldImg"/>
+          </p:nvPr>
+        </p:nvSpPr>
+        <p:spPr/>
+      </p:sp>
+      <p:sp>
+        <p:nvSpPr>
+          <p:cNvPr id="3" name="Zástupný symbol pro poznámky 2"/>
+          <p:cNvSpPr>
+            <a:spLocks noGrp="1"/>
+          </p:cNvSpPr>
+          <p:nvPr>
+            <p:ph type="body" idx="1"/>
+          </p:nvPr>
+        </p:nvSpPr>
+        <p:spPr/>
+        <p:txBody>
+          <a:bodyPr/>
+          <a:lstStyle/>
+          <a:p>
+            <a:endParaRPr lang="cs-CZ"/>
+          </a:p>
+        </p:txBody>
+      </p:sp>
+      <p:sp>
+        <p:nvSpPr>
+          <p:cNvPr id="4" name="Zástupný symbol pro číslo snímku 3"/>
+          <p:cNvSpPr>
+            <a:spLocks noGrp="1"/>
+          </p:cNvSpPr>
+          <p:nvPr>
+            <p:ph type="sldNum" sz="quarter" idx="5"/>
+          </p:nvPr>
+        </p:nvSpPr>
+        <p:spPr/>
+        <p:txBody>
+          <a:bodyPr/>
+          <a:lstStyle/>
+          <a:p>
+            <a:fld id="{D93DBBC2-0A93-45A2-B591-A3FFF136712D}" type="slidenum">
+              <a:rPr lang="cs-CZ" smtClean="0"/>
+              <a:t>5</a:t>
+            </a:fld>
+            <a:endParaRPr lang="cs-CZ"/>
+          </a:p>
+        </p:txBody>
+      </p:sp>
+    </p:spTree>
+    <p:extLst>
+      <p:ext uri="{BB962C8B-B14F-4D97-AF65-F5344CB8AC3E}">
+        <p14:creationId xmlns:p14="http://schemas.microsoft.com/office/powerpoint/2010/main" val="1694040880"/>
+      </p:ext>
+    </p:extLst>
+  </p:cSld>
+  <p:clrMapOvr>
+    <a:masterClrMapping/>
+  </p:clrMapOvr>
+</p:notes>
+</file>
+
+<file path=ppt/notesSlides/notesSlide6.xml><?xml version="1.0" encoding="utf-8"?>
+<p:notes xmlns:a="http://schemas.openxmlformats.org/drawingml/2006/main" xmlns:r="http://schemas.openxmlformats.org/officeDocument/2006/relationships" xmlns:p="http://schemas.openxmlformats.org/presentationml/2006/main">
+  <p:cSld>
+    <p:spTree>
+      <p:nvGrpSpPr>
+        <p:cNvPr id="1" name=""/>
+        <p:cNvGrpSpPr/>
+        <p:nvPr/>
+      </p:nvGrpSpPr>
+      <p:grpSpPr>
+        <a:xfrm>
+          <a:off x="0" y="0"/>
+          <a:ext cx="0" cy="0"/>
+          <a:chOff x="0" y="0"/>
+          <a:chExt cx="0" cy="0"/>
+        </a:xfrm>
+      </p:grpSpPr>
+      <p:sp>
+        <p:nvSpPr>
+          <p:cNvPr id="2" name="Zástupný symbol pro obrázek snímku 1"/>
+          <p:cNvSpPr>
+            <a:spLocks noGrp="1" noRot="1" noChangeAspect="1"/>
+          </p:cNvSpPr>
+          <p:nvPr>
+            <p:ph type="sldImg"/>
+          </p:nvPr>
+        </p:nvSpPr>
+        <p:spPr/>
+      </p:sp>
+      <p:sp>
+        <p:nvSpPr>
+          <p:cNvPr id="3" name="Zástupný symbol pro poznámky 2"/>
+          <p:cNvSpPr>
+            <a:spLocks noGrp="1"/>
+          </p:cNvSpPr>
+          <p:nvPr>
+            <p:ph type="body" idx="1"/>
+          </p:nvPr>
+        </p:nvSpPr>
+        <p:spPr/>
+        <p:txBody>
+          <a:bodyPr/>
+          <a:lstStyle/>
+          <a:p>
+            <a:endParaRPr lang="cs-CZ"/>
+          </a:p>
+        </p:txBody>
+      </p:sp>
+      <p:sp>
+        <p:nvSpPr>
+          <p:cNvPr id="4" name="Zástupný symbol pro číslo snímku 3"/>
+          <p:cNvSpPr>
+            <a:spLocks noGrp="1"/>
+          </p:cNvSpPr>
+          <p:nvPr>
+            <p:ph type="sldNum" sz="quarter" idx="5"/>
+          </p:nvPr>
+        </p:nvSpPr>
+        <p:spPr/>
+        <p:txBody>
+          <a:bodyPr/>
+          <a:lstStyle/>
+          <a:p>
+            <a:fld id="{D93DBBC2-0A93-45A2-B591-A3FFF136712D}" type="slidenum">
+              <a:rPr lang="cs-CZ" smtClean="0"/>
+              <a:t>6</a:t>
+            </a:fld>
+            <a:endParaRPr lang="cs-CZ"/>
+          </a:p>
+        </p:txBody>
+      </p:sp>
+    </p:spTree>
+    <p:extLst>
+      <p:ext uri="{BB962C8B-B14F-4D97-AF65-F5344CB8AC3E}">
+        <p14:creationId xmlns:p14="http://schemas.microsoft.com/office/powerpoint/2010/main" val="3335995013"/>
+      </p:ext>
+    </p:extLst>
+  </p:cSld>
+  <p:clrMapOvr>
+    <a:masterClrMapping/>
+  </p:clrMapOvr>
+</p:notes>
+</file>
+
+<file path=ppt/notesSlides/notesSlide7.xml><?xml version="1.0" encoding="utf-8"?>
+<p:notes xmlns:a="http://schemas.openxmlformats.org/drawingml/2006/main" xmlns:r="http://schemas.openxmlformats.org/officeDocument/2006/relationships" xmlns:p="http://schemas.openxmlformats.org/presentationml/2006/main">
+  <p:cSld>
+    <p:spTree>
+      <p:nvGrpSpPr>
+        <p:cNvPr id="1" name=""/>
+        <p:cNvGrpSpPr/>
+        <p:nvPr/>
+      </p:nvGrpSpPr>
+      <p:grpSpPr>
+        <a:xfrm>
+          <a:off x="0" y="0"/>
+          <a:ext cx="0" cy="0"/>
+          <a:chOff x="0" y="0"/>
+          <a:chExt cx="0" cy="0"/>
+        </a:xfrm>
+      </p:grpSpPr>
+      <p:sp>
+        <p:nvSpPr>
+          <p:cNvPr id="2" name="Zástupný symbol pro obrázek snímku 1"/>
+          <p:cNvSpPr>
+            <a:spLocks noGrp="1" noRot="1" noChangeAspect="1"/>
+          </p:cNvSpPr>
+          <p:nvPr>
+            <p:ph type="sldImg"/>
+          </p:nvPr>
+        </p:nvSpPr>
+        <p:spPr/>
+      </p:sp>
+      <p:sp>
+        <p:nvSpPr>
+          <p:cNvPr id="3" name="Zástupný symbol pro poznámky 2"/>
+          <p:cNvSpPr>
+            <a:spLocks noGrp="1"/>
+          </p:cNvSpPr>
+          <p:nvPr>
+            <p:ph type="body" idx="1"/>
+          </p:nvPr>
+        </p:nvSpPr>
+        <p:spPr/>
+        <p:txBody>
+          <a:bodyPr/>
+          <a:lstStyle/>
+          <a:p>
+            <a:endParaRPr lang="cs-CZ"/>
+          </a:p>
+        </p:txBody>
+      </p:sp>
+      <p:sp>
+        <p:nvSpPr>
+          <p:cNvPr id="4" name="Zástupný symbol pro číslo snímku 3"/>
+          <p:cNvSpPr>
+            <a:spLocks noGrp="1"/>
+          </p:cNvSpPr>
+          <p:nvPr>
+            <p:ph type="sldNum" sz="quarter" idx="5"/>
+          </p:nvPr>
+        </p:nvSpPr>
+        <p:spPr/>
+        <p:txBody>
+          <a:bodyPr/>
+          <a:lstStyle/>
+          <a:p>
+            <a:fld id="{D93DBBC2-0A93-45A2-B591-A3FFF136712D}" type="slidenum">
+              <a:rPr lang="cs-CZ" smtClean="0"/>
+              <a:t>7</a:t>
+            </a:fld>
+            <a:endParaRPr lang="cs-CZ"/>
+          </a:p>
+        </p:txBody>
+      </p:sp>
+    </p:spTree>
+    <p:extLst>
+      <p:ext uri="{BB962C8B-B14F-4D97-AF65-F5344CB8AC3E}">
+        <p14:creationId xmlns:p14="http://schemas.microsoft.com/office/powerpoint/2010/main" val="2929057703"/>
+      </p:ext>
+    </p:extLst>
+  </p:cSld>
+  <p:clrMapOvr>
+    <a:masterClrMapping/>
+  </p:clrMapOvr>
+</p:notes>
+</file>
+
+<file path=ppt/notesSlides/notesSlide8.xml><?xml version="1.0" encoding="utf-8"?>
+<p:notes xmlns:a="http://schemas.openxmlformats.org/drawingml/2006/main" xmlns:r="http://schemas.openxmlformats.org/officeDocument/2006/relationships" xmlns:p="http://schemas.openxmlformats.org/presentationml/2006/main">
+  <p:cSld>
+    <p:spTree>
+      <p:nvGrpSpPr>
+        <p:cNvPr id="1" name=""/>
+        <p:cNvGrpSpPr/>
+        <p:nvPr/>
+      </p:nvGrpSpPr>
+      <p:grpSpPr>
+        <a:xfrm>
+          <a:off x="0" y="0"/>
+          <a:ext cx="0" cy="0"/>
+          <a:chOff x="0" y="0"/>
+          <a:chExt cx="0" cy="0"/>
+        </a:xfrm>
+      </p:grpSpPr>
+      <p:sp>
+        <p:nvSpPr>
+          <p:cNvPr id="2" name="Zástupný symbol pro obrázek snímku 1"/>
+          <p:cNvSpPr>
+            <a:spLocks noGrp="1" noRot="1" noChangeAspect="1"/>
+          </p:cNvSpPr>
+          <p:nvPr>
+            <p:ph type="sldImg"/>
+          </p:nvPr>
+        </p:nvSpPr>
+        <p:spPr/>
+      </p:sp>
+      <p:sp>
+        <p:nvSpPr>
+          <p:cNvPr id="3" name="Zástupný symbol pro poznámky 2"/>
+          <p:cNvSpPr>
+            <a:spLocks noGrp="1"/>
+          </p:cNvSpPr>
+          <p:nvPr>
+            <p:ph type="body" idx="1"/>
+          </p:nvPr>
+        </p:nvSpPr>
+        <p:spPr/>
+        <p:txBody>
+          <a:bodyPr/>
+          <a:lstStyle/>
+          <a:p>
+            <a:endParaRPr lang="cs-CZ"/>
+          </a:p>
+        </p:txBody>
+      </p:sp>
+      <p:sp>
+        <p:nvSpPr>
+          <p:cNvPr id="4" name="Zástupný symbol pro číslo snímku 3"/>
+          <p:cNvSpPr>
+            <a:spLocks noGrp="1"/>
+          </p:cNvSpPr>
+          <p:nvPr>
+            <p:ph type="sldNum" sz="quarter" idx="5"/>
+          </p:nvPr>
+        </p:nvSpPr>
+        <p:spPr/>
+        <p:txBody>
+          <a:bodyPr/>
+          <a:lstStyle/>
+          <a:p>
+            <a:fld id="{D93DBBC2-0A93-45A2-B591-A3FFF136712D}" type="slidenum">
+              <a:rPr lang="cs-CZ" smtClean="0"/>
+              <a:t>8</a:t>
+            </a:fld>
+            <a:endParaRPr lang="cs-CZ"/>
+          </a:p>
+        </p:txBody>
+      </p:sp>
+    </p:spTree>
+    <p:extLst>
+      <p:ext uri="{BB962C8B-B14F-4D97-AF65-F5344CB8AC3E}">
+        <p14:creationId xmlns:p14="http://schemas.microsoft.com/office/powerpoint/2010/main" val="602856307"/>
+      </p:ext>
+    </p:extLst>
+  </p:cSld>
+  <p:clrMapOvr>
+    <a:masterClrMapping/>
+  </p:clrMapOvr>
+</p:notes>
+</file>
+
+<file path=ppt/notesSlides/notesSlide9.xml><?xml version="1.0" encoding="utf-8"?>
+<p:notes xmlns:a="http://schemas.openxmlformats.org/drawingml/2006/main" xmlns:r="http://schemas.openxmlformats.org/officeDocument/2006/relationships" xmlns:p="http://schemas.openxmlformats.org/presentationml/2006/main">
+  <p:cSld>
+    <p:spTree>
+      <p:nvGrpSpPr>
+        <p:cNvPr id="1" name=""/>
+        <p:cNvGrpSpPr/>
+        <p:nvPr/>
+      </p:nvGrpSpPr>
+      <p:grpSpPr>
+        <a:xfrm>
+          <a:off x="0" y="0"/>
+          <a:ext cx="0" cy="0"/>
+          <a:chOff x="0" y="0"/>
+          <a:chExt cx="0" cy="0"/>
+        </a:xfrm>
+      </p:grpSpPr>
+      <p:sp>
+        <p:nvSpPr>
+          <p:cNvPr id="2" name="Zástupný symbol pro obrázek snímku 1"/>
+          <p:cNvSpPr>
+            <a:spLocks noGrp="1" noRot="1" noChangeAspect="1"/>
+          </p:cNvSpPr>
+          <p:nvPr>
+            <p:ph type="sldImg"/>
+          </p:nvPr>
+        </p:nvSpPr>
+        <p:spPr/>
+      </p:sp>
+      <p:sp>
+        <p:nvSpPr>
+          <p:cNvPr id="3" name="Zástupný symbol pro poznámky 2"/>
+          <p:cNvSpPr>
+            <a:spLocks noGrp="1"/>
+          </p:cNvSpPr>
+          <p:nvPr>
+            <p:ph type="body" idx="1"/>
+          </p:nvPr>
+        </p:nvSpPr>
+        <p:spPr/>
+        <p:txBody>
+          <a:bodyPr/>
+          <a:lstStyle/>
+          <a:p>
+            <a:r>
+              <a:rPr lang="cs-CZ" dirty="0">
+                <a:hlinkClick r:id="rId3"/>
+              </a:rPr>
+              <a:t>https://git-scm.com/book/en/v2/Getting-Started-Installing-Git</a:t>
+            </a:r>
+            <a:endParaRPr lang="cs-CZ" dirty="0"/>
+          </a:p>
+          <a:p>
+            <a:r>
+              <a:rPr lang="cs-CZ" dirty="0">
+                <a:hlinkClick r:id="rId4"/>
+              </a:rPr>
+              <a:t>https://gitforwindows.org/</a:t>
+            </a:r>
+            <a:endParaRPr lang="cs-CZ" dirty="0"/>
+          </a:p>
+          <a:p>
+            <a:endParaRPr lang="cs-CZ" dirty="0"/>
+          </a:p>
+        </p:txBody>
+      </p:sp>
+      <p:sp>
+        <p:nvSpPr>
+          <p:cNvPr id="4" name="Zástupný symbol pro číslo snímku 3"/>
+          <p:cNvSpPr>
+            <a:spLocks noGrp="1"/>
+          </p:cNvSpPr>
+          <p:nvPr>
+            <p:ph type="sldNum" sz="quarter" idx="5"/>
+          </p:nvPr>
+        </p:nvSpPr>
+        <p:spPr/>
+        <p:txBody>
+          <a:bodyPr/>
+          <a:lstStyle/>
+          <a:p>
+            <a:fld id="{D93DBBC2-0A93-45A2-B591-A3FFF136712D}" type="slidenum">
+              <a:rPr lang="cs-CZ" smtClean="0"/>
+              <a:t>9</a:t>
+            </a:fld>
+            <a:endParaRPr lang="cs-CZ"/>
+          </a:p>
+        </p:txBody>
+      </p:sp>
+    </p:spTree>
+    <p:extLst>
+      <p:ext uri="{BB962C8B-B14F-4D97-AF65-F5344CB8AC3E}">
+        <p14:creationId xmlns:p14="http://schemas.microsoft.com/office/powerpoint/2010/main" val="2117815049"/>
       </p:ext>
     </p:extLst>
   </p:cSld>
@@ -4482,12 +6661,16 @@
           <a:p>
             <a:pPr lvl="1"/>
             <a:r>
+              <a:rPr lang="cs-CZ" dirty="0"/>
+              <a:t>` </a:t>
+            </a:r>
+            <a:r>
               <a:rPr lang="cs-CZ" dirty="0" err="1"/>
               <a:t>url</a:t>
             </a:r>
             <a:r>
               <a:rPr lang="cs-CZ" dirty="0"/>
-              <a:t> většinou začíná na </a:t>
+              <a:t> začíná na </a:t>
             </a:r>
             <a:r>
               <a:rPr lang="cs-CZ" dirty="0" err="1"/>
@@ -6641,8 +8824,13 @@
           <a:p>
             <a:r>
               <a:rPr lang="cs-CZ" dirty="0"/>
-              <a:t>Instalace balíku</a:t>
-            </a:r>
+              <a:t>Instalace </a:t>
+            </a:r>
+            <a:r>
+              <a:rPr lang="cs-CZ" dirty="0" err="1"/>
+              <a:t>git</a:t>
+            </a:r>
+            <a:endParaRPr lang="cs-CZ" dirty="0"/>
           </a:p>
           <a:p>
             <a:r>
@@ -6711,64 +8899,69 @@
           <a:p>
             <a:r>
               <a:rPr lang="cs-CZ" dirty="0"/>
-              <a:t>FOSS </a:t>
-            </a:r>
-            <a:r>
-              <a:rPr lang="cs-CZ" dirty="0" err="1"/>
-              <a:t>strikes</a:t>
-            </a:r>
-            <a:r>
-              <a:rPr lang="cs-CZ" dirty="0"/>
-              <a:t> </a:t>
-            </a:r>
-            <a:r>
-              <a:rPr lang="cs-CZ" dirty="0" err="1"/>
-              <a:t>back</a:t>
+              <a:t>GitHub – více</a:t>
+            </a:r>
+          </a:p>
+        </p:txBody>
+      </p:sp>
+      <p:sp>
+        <p:nvSpPr>
+          <p:cNvPr id="3" name="Zástupný obsah 2">
+            <a:extLst>
+              <a:ext uri="{FF2B5EF4-FFF2-40B4-BE49-F238E27FC236}">
+                <a16:creationId xmlns:a16="http://schemas.microsoft.com/office/drawing/2014/main" id="{8C0B78AC-48C8-43C2-A148-0E6E0D774322}"/>
+              </a:ext>
+            </a:extLst>
+          </p:cNvPr>
+          <p:cNvSpPr>
+            <a:spLocks noGrp="1"/>
+          </p:cNvSpPr>
+          <p:nvPr>
+            <p:ph idx="1"/>
+          </p:nvPr>
+        </p:nvSpPr>
+        <p:spPr/>
+        <p:txBody>
+          <a:bodyPr/>
+          <a:lstStyle/>
+          <a:p>
+            <a:r>
+              <a:rPr lang="cs-CZ" dirty="0" err="1"/>
+              <a:t>Markdown</a:t>
+            </a:r>
+            <a:r>
+              <a:rPr lang="cs-CZ" dirty="0"/>
+              <a:t> (README apod.)</a:t>
+            </a:r>
+          </a:p>
+          <a:p>
+            <a:r>
+              <a:rPr lang="cs-CZ" dirty="0"/>
+              <a:t>GitHub </a:t>
+            </a:r>
+            <a:r>
+              <a:rPr lang="cs-CZ" dirty="0" err="1"/>
+              <a:t>pages</a:t>
             </a:r>
             <a:endParaRPr lang="cs-CZ" dirty="0"/>
           </a:p>
-        </p:txBody>
-      </p:sp>
-      <p:sp>
-        <p:nvSpPr>
-          <p:cNvPr id="3" name="Zástupný obsah 2">
-            <a:extLst>
-              <a:ext uri="{FF2B5EF4-FFF2-40B4-BE49-F238E27FC236}">
-                <a16:creationId xmlns:a16="http://schemas.microsoft.com/office/drawing/2014/main" id="{8C0B78AC-48C8-43C2-A148-0E6E0D774322}"/>
-              </a:ext>
-            </a:extLst>
-          </p:cNvPr>
-          <p:cNvSpPr>
-            <a:spLocks noGrp="1"/>
-          </p:cNvSpPr>
-          <p:nvPr>
-            <p:ph idx="1"/>
-          </p:nvPr>
-        </p:nvSpPr>
-        <p:spPr/>
-        <p:txBody>
-          <a:bodyPr/>
-          <a:lstStyle/>
-          <a:p>
-            <a:r>
-              <a:rPr lang="cs-CZ" dirty="0"/>
-              <a:t>Organizace</a:t>
-            </a:r>
-          </a:p>
-          <a:p>
-            <a:r>
-              <a:rPr lang="cs-CZ" dirty="0"/>
-              <a:t>Přispívání</a:t>
-            </a:r>
-          </a:p>
-          <a:p>
-            <a:r>
-              <a:rPr lang="cs-CZ" dirty="0"/>
-              <a:t>Typy </a:t>
-            </a:r>
-            <a:r>
-              <a:rPr lang="cs-CZ" dirty="0" err="1"/>
-              <a:t>licensí</a:t>
+          <a:p>
+            <a:r>
+              <a:rPr lang="cs-CZ" dirty="0"/>
+              <a:t>CI</a:t>
+            </a:r>
+          </a:p>
+          <a:p>
+            <a:r>
+              <a:rPr lang="cs-CZ" dirty="0" err="1"/>
+              <a:t>Discussions</a:t>
+            </a:r>
+            <a:endParaRPr lang="cs-CZ" dirty="0"/>
+          </a:p>
+          <a:p>
+            <a:r>
+              <a:rPr lang="cs-CZ" dirty="0" err="1"/>
+              <a:t>Issues</a:t>
             </a:r>
             <a:endParaRPr lang="cs-CZ" dirty="0"/>
           </a:p>
@@ -6777,7 +8970,7 @@
     </p:spTree>
     <p:extLst>
       <p:ext uri="{BB962C8B-B14F-4D97-AF65-F5344CB8AC3E}">
-        <p14:creationId xmlns:p14="http://schemas.microsoft.com/office/powerpoint/2010/main" val="1329908745"/>
+        <p14:creationId xmlns:p14="http://schemas.microsoft.com/office/powerpoint/2010/main" val="1254594001"/>
       </p:ext>
     </p:extLst>
   </p:cSld>
@@ -6827,6 +9020,128 @@
           <a:p>
             <a:r>
               <a:rPr lang="cs-CZ" dirty="0"/>
+              <a:t>FOSS </a:t>
+            </a:r>
+            <a:r>
+              <a:rPr lang="cs-CZ" dirty="0" err="1"/>
+              <a:t>strikes</a:t>
+            </a:r>
+            <a:r>
+              <a:rPr lang="cs-CZ" dirty="0"/>
+              <a:t> </a:t>
+            </a:r>
+            <a:r>
+              <a:rPr lang="cs-CZ" dirty="0" err="1"/>
+              <a:t>back</a:t>
+            </a:r>
+            <a:endParaRPr lang="cs-CZ" dirty="0"/>
+          </a:p>
+        </p:txBody>
+      </p:sp>
+      <p:sp>
+        <p:nvSpPr>
+          <p:cNvPr id="3" name="Zástupný obsah 2">
+            <a:extLst>
+              <a:ext uri="{FF2B5EF4-FFF2-40B4-BE49-F238E27FC236}">
+                <a16:creationId xmlns:a16="http://schemas.microsoft.com/office/drawing/2014/main" id="{8C0B78AC-48C8-43C2-A148-0E6E0D774322}"/>
+              </a:ext>
+            </a:extLst>
+          </p:cNvPr>
+          <p:cNvSpPr>
+            <a:spLocks noGrp="1"/>
+          </p:cNvSpPr>
+          <p:nvPr>
+            <p:ph idx="1"/>
+          </p:nvPr>
+        </p:nvSpPr>
+        <p:spPr/>
+        <p:txBody>
+          <a:bodyPr/>
+          <a:lstStyle/>
+          <a:p>
+            <a:r>
+              <a:rPr lang="cs-CZ" dirty="0"/>
+              <a:t>Organizace</a:t>
+            </a:r>
+          </a:p>
+          <a:p>
+            <a:r>
+              <a:rPr lang="cs-CZ" dirty="0"/>
+              <a:t>Přispívání</a:t>
+            </a:r>
+          </a:p>
+          <a:p>
+            <a:r>
+              <a:rPr lang="cs-CZ" dirty="0"/>
+              <a:t>Typy </a:t>
+            </a:r>
+            <a:r>
+              <a:rPr lang="cs-CZ" dirty="0" err="1"/>
+              <a:t>licensí</a:t>
+            </a:r>
+            <a:endParaRPr lang="cs-CZ" dirty="0"/>
+          </a:p>
+          <a:p>
+            <a:r>
+              <a:rPr lang="cs-CZ" dirty="0"/>
+              <a:t>Editory</a:t>
+            </a:r>
+          </a:p>
+        </p:txBody>
+      </p:sp>
+    </p:spTree>
+    <p:extLst>
+      <p:ext uri="{BB962C8B-B14F-4D97-AF65-F5344CB8AC3E}">
+        <p14:creationId xmlns:p14="http://schemas.microsoft.com/office/powerpoint/2010/main" val="1329908745"/>
+      </p:ext>
+    </p:extLst>
+  </p:cSld>
+  <p:clrMapOvr>
+    <a:masterClrMapping/>
+  </p:clrMapOvr>
+</p:sld>
+</file>
+
+<file path=ppt/slides/slide27.xml><?xml version="1.0" encoding="utf-8"?>
+<p:sld xmlns:a="http://schemas.openxmlformats.org/drawingml/2006/main" xmlns:r="http://schemas.openxmlformats.org/officeDocument/2006/relationships" xmlns:p="http://schemas.openxmlformats.org/presentationml/2006/main">
+  <p:cSld>
+    <p:spTree>
+      <p:nvGrpSpPr>
+        <p:cNvPr id="1" name=""/>
+        <p:cNvGrpSpPr/>
+        <p:nvPr/>
+      </p:nvGrpSpPr>
+      <p:grpSpPr>
+        <a:xfrm>
+          <a:off x="0" y="0"/>
+          <a:ext cx="0" cy="0"/>
+          <a:chOff x="0" y="0"/>
+          <a:chExt cx="0" cy="0"/>
+        </a:xfrm>
+      </p:grpSpPr>
+      <p:sp>
+        <p:nvSpPr>
+          <p:cNvPr id="2" name="Nadpis 1">
+            <a:extLst>
+              <a:ext uri="{FF2B5EF4-FFF2-40B4-BE49-F238E27FC236}">
+                <a16:creationId xmlns:a16="http://schemas.microsoft.com/office/drawing/2014/main" id="{2906D276-6EF3-456E-AE83-D4A55735319B}"/>
+              </a:ext>
+            </a:extLst>
+          </p:cNvPr>
+          <p:cNvSpPr>
+            <a:spLocks noGrp="1"/>
+          </p:cNvSpPr>
+          <p:nvPr>
+            <p:ph type="title"/>
+          </p:nvPr>
+        </p:nvSpPr>
+        <p:spPr/>
+        <p:txBody>
+          <a:bodyPr/>
+          <a:lstStyle/>
+          <a:p>
+            <a:r>
+              <a:rPr lang="cs-CZ" dirty="0"/>
               <a:t>AMA do finále</a:t>
             </a:r>
           </a:p>
@@ -6858,7 +9173,7 @@
                 <a:solidFill>
                   <a:schemeClr val="tx1"/>
                 </a:solidFill>
-                <a:hlinkClick r:id="rId2"/>
+                <a:hlinkClick r:id="rId3"/>
               </a:rPr>
               <a:t>https://github.com/pepe</a:t>
             </a:r>
@@ -6874,7 +9189,7 @@
                 <a:solidFill>
                   <a:schemeClr val="tx1"/>
                 </a:solidFill>
-                <a:hlinkClick r:id="rId3"/>
+                <a:hlinkClick r:id="rId4"/>
               </a:rPr>
               <a:t>https://git.sr.ht/~pepe</a:t>
             </a:r>
@@ -7165,7 +9480,7 @@
           <p:nvPr/>
         </p:nvPicPr>
         <p:blipFill>
-          <a:blip r:embed="rId2">
+          <a:blip r:embed="rId3">
             <a:extLst>
               <a:ext uri="{28A0092B-C50C-407E-A947-70E740481C1C}">
                 <a14:useLocalDpi xmlns:a14="http://schemas.microsoft.com/office/drawing/2010/main" val="0"/>
@@ -7700,13 +10015,8 @@
             </a:r>
             <a:r>
               <a:rPr lang="cs-CZ" dirty="0"/>
-              <a:t> </a:t>
-            </a:r>
-            <a:r>
-              <a:rPr lang="cs-CZ"/>
-              <a:t>– slovníček</a:t>
-            </a:r>
-            <a:endParaRPr lang="cs-CZ" dirty="0"/>
+              <a:t> – slovníček</a:t>
+            </a:r>
           </a:p>
         </p:txBody>
       </p:sp>
@@ -8115,18 +10425,6 @@
               <a:rPr lang="cs-CZ" dirty="0"/>
               <a:t>Windows – instalátor</a:t>
             </a:r>
-          </a:p>
-          <a:p>
-            <a:pPr lvl="1"/>
-            <a:r>
-              <a:rPr lang="cs-CZ" dirty="0"/>
-              <a:t>Nejen </a:t>
-            </a:r>
-            <a:r>
-              <a:rPr lang="cs-CZ" dirty="0" err="1"/>
-              <a:t>git</a:t>
-            </a:r>
-            <a:endParaRPr lang="cs-CZ" dirty="0"/>
           </a:p>
           <a:p>
             <a:r>

</xml_diff>